<commit_message>
Add 4. ClientNotifier project screenshots in the presentation
</commit_message>
<xml_diff>
--- a/Dependency Injection.pptx
+++ b/Dependency Injection.pptx
@@ -13,6 +13,8 @@
     <p:sldId id="262" r:id="rId7"/>
     <p:sldId id="263" r:id="rId8"/>
     <p:sldId id="264" r:id="rId9"/>
+    <p:sldId id="265" r:id="rId10"/>
+    <p:sldId id="266" r:id="rId11"/>
   </p:sldIdLst>
   <p:sldSz cx="12192000" cy="6858000"/>
   <p:notesSz cx="6858000" cy="9144000"/>
@@ -13487,6 +13489,519 @@
 </p:sld>
 </file>
 
+<file path=ppt/slides/slide10.xml><?xml version="1.0" encoding="utf-8"?>
+<p:sld xmlns:a="http://schemas.openxmlformats.org/drawingml/2006/main" xmlns:r="http://schemas.openxmlformats.org/officeDocument/2006/relationships" xmlns:p="http://schemas.openxmlformats.org/presentationml/2006/main">
+  <p:cSld>
+    <p:spTree>
+      <p:nvGrpSpPr>
+        <p:cNvPr id="1" name=""/>
+        <p:cNvGrpSpPr/>
+        <p:nvPr/>
+      </p:nvGrpSpPr>
+      <p:grpSpPr>
+        <a:xfrm>
+          <a:off x="0" y="0"/>
+          <a:ext cx="0" cy="0"/>
+          <a:chOff x="0" y="0"/>
+          <a:chExt cx="0" cy="0"/>
+        </a:xfrm>
+      </p:grpSpPr>
+      <p:sp>
+        <p:nvSpPr>
+          <p:cNvPr id="2" name="Title 1">
+            <a:extLst>
+              <a:ext uri="{FF2B5EF4-FFF2-40B4-BE49-F238E27FC236}">
+                <a16:creationId xmlns:a16="http://schemas.microsoft.com/office/drawing/2014/main" id="{3AB6EEBD-DE5B-6BD7-24F1-BFBACDE5FB1B}"/>
+              </a:ext>
+            </a:extLst>
+          </p:cNvPr>
+          <p:cNvSpPr>
+            <a:spLocks noGrp="1"/>
+          </p:cNvSpPr>
+          <p:nvPr>
+            <p:ph type="title"/>
+          </p:nvPr>
+        </p:nvSpPr>
+        <p:spPr/>
+        <p:txBody>
+          <a:bodyPr/>
+          <a:lstStyle/>
+          <a:p>
+            <a:pPr algn="ctr"/>
+            <a:r>
+              <a:rPr lang="en-US" sz="3600" dirty="0">
+                <a:latin typeface="Arial" panose="020B0604020202020204" pitchFamily="34" charset="0"/>
+                <a:cs typeface="Arial" panose="020B0604020202020204" pitchFamily="34" charset="0"/>
+              </a:rPr>
+              <a:t>2. </a:t>
+            </a:r>
+            <a:r>
+              <a:rPr lang="en-US" sz="3200" dirty="0">
+                <a:latin typeface="Arial" panose="020B0604020202020204" pitchFamily="34" charset="0"/>
+                <a:cs typeface="Arial" panose="020B0604020202020204" pitchFamily="34" charset="0"/>
+              </a:rPr>
+              <a:t>Loose Coupled Code </a:t>
+            </a:r>
+            <a:br>
+              <a:rPr lang="en-US" sz="3200" dirty="0">
+                <a:latin typeface="Arial" panose="020B0604020202020204" pitchFamily="34" charset="0"/>
+                <a:cs typeface="Arial" panose="020B0604020202020204" pitchFamily="34" charset="0"/>
+              </a:rPr>
+            </a:br>
+            <a:r>
+              <a:rPr lang="en-US" sz="3200" dirty="0">
+                <a:latin typeface="Arial" panose="020B0604020202020204" pitchFamily="34" charset="0"/>
+                <a:cs typeface="Arial" panose="020B0604020202020204" pitchFamily="34" charset="0"/>
+              </a:rPr>
+              <a:t>(Client Notifier)</a:t>
+            </a:r>
+            <a:endParaRPr lang="bg-BG" sz="3200" dirty="0"/>
+          </a:p>
+        </p:txBody>
+      </p:sp>
+      <p:pic>
+        <p:nvPicPr>
+          <p:cNvPr id="5" name="Picture 4" descr="A screenshot of a computer program&#10;&#10;Description automatically generated">
+            <a:extLst>
+              <a:ext uri="{FF2B5EF4-FFF2-40B4-BE49-F238E27FC236}">
+                <a16:creationId xmlns:a16="http://schemas.microsoft.com/office/drawing/2014/main" id="{DB6D9DCB-01C1-9765-30FB-99BB44BA4A00}"/>
+              </a:ext>
+            </a:extLst>
+          </p:cNvPr>
+          <p:cNvPicPr>
+            <a:picLocks noChangeAspect="1"/>
+          </p:cNvPicPr>
+          <p:nvPr/>
+        </p:nvPicPr>
+        <p:blipFill>
+          <a:blip r:embed="rId2">
+            <a:extLst>
+              <a:ext uri="{28A0092B-C50C-407E-A947-70E740481C1C}">
+                <a14:useLocalDpi xmlns:a14="http://schemas.microsoft.com/office/drawing/2010/main" val="0"/>
+              </a:ext>
+            </a:extLst>
+          </a:blip>
+          <a:stretch>
+            <a:fillRect/>
+          </a:stretch>
+        </p:blipFill>
+        <p:spPr>
+          <a:xfrm>
+            <a:off x="6213739" y="2617885"/>
+            <a:ext cx="5628053" cy="3651110"/>
+          </a:xfrm>
+          <a:prstGeom prst="rect">
+            <a:avLst/>
+          </a:prstGeom>
+        </p:spPr>
+      </p:pic>
+      <p:pic>
+        <p:nvPicPr>
+          <p:cNvPr id="7" name="Picture 6" descr="A close up of text&#10;&#10;Description automatically generated">
+            <a:extLst>
+              <a:ext uri="{FF2B5EF4-FFF2-40B4-BE49-F238E27FC236}">
+                <a16:creationId xmlns:a16="http://schemas.microsoft.com/office/drawing/2014/main" id="{2C622ADA-E7BE-4162-394B-F00E8462145E}"/>
+              </a:ext>
+            </a:extLst>
+          </p:cNvPr>
+          <p:cNvPicPr>
+            <a:picLocks noChangeAspect="1"/>
+          </p:cNvPicPr>
+          <p:nvPr/>
+        </p:nvPicPr>
+        <p:blipFill>
+          <a:blip r:embed="rId3">
+            <a:extLst>
+              <a:ext uri="{28A0092B-C50C-407E-A947-70E740481C1C}">
+                <a14:useLocalDpi xmlns:a14="http://schemas.microsoft.com/office/drawing/2010/main" val="0"/>
+              </a:ext>
+            </a:extLst>
+          </a:blip>
+          <a:stretch>
+            <a:fillRect/>
+          </a:stretch>
+        </p:blipFill>
+        <p:spPr>
+          <a:xfrm>
+            <a:off x="3178812" y="3801951"/>
+            <a:ext cx="2765505" cy="809416"/>
+          </a:xfrm>
+          <a:prstGeom prst="rect">
+            <a:avLst/>
+          </a:prstGeom>
+        </p:spPr>
+      </p:pic>
+      <p:pic>
+        <p:nvPicPr>
+          <p:cNvPr id="9" name="Picture 8" descr="A screen shot of a message&#10;&#10;Description automatically generated">
+            <a:extLst>
+              <a:ext uri="{FF2B5EF4-FFF2-40B4-BE49-F238E27FC236}">
+                <a16:creationId xmlns:a16="http://schemas.microsoft.com/office/drawing/2014/main" id="{F9D1F636-EE0F-2E81-A1E6-E2D52C08184C}"/>
+              </a:ext>
+            </a:extLst>
+          </p:cNvPr>
+          <p:cNvPicPr>
+            <a:picLocks noChangeAspect="1"/>
+          </p:cNvPicPr>
+          <p:nvPr/>
+        </p:nvPicPr>
+        <p:blipFill>
+          <a:blip r:embed="rId4">
+            <a:extLst>
+              <a:ext uri="{28A0092B-C50C-407E-A947-70E740481C1C}">
+                <a14:useLocalDpi xmlns:a14="http://schemas.microsoft.com/office/drawing/2010/main" val="0"/>
+              </a:ext>
+            </a:extLst>
+          </a:blip>
+          <a:stretch>
+            <a:fillRect/>
+          </a:stretch>
+        </p:blipFill>
+        <p:spPr>
+          <a:xfrm>
+            <a:off x="350208" y="2366184"/>
+            <a:ext cx="3145790" cy="1154923"/>
+          </a:xfrm>
+          <a:prstGeom prst="rect">
+            <a:avLst/>
+          </a:prstGeom>
+        </p:spPr>
+      </p:pic>
+      <p:pic>
+        <p:nvPicPr>
+          <p:cNvPr id="11" name="Picture 10" descr="A screen shot of a message&#10;&#10;Description automatically generated">
+            <a:extLst>
+              <a:ext uri="{FF2B5EF4-FFF2-40B4-BE49-F238E27FC236}">
+                <a16:creationId xmlns:a16="http://schemas.microsoft.com/office/drawing/2014/main" id="{42311EC2-8F04-AC01-70B7-2D4DF08725CC}"/>
+              </a:ext>
+            </a:extLst>
+          </p:cNvPr>
+          <p:cNvPicPr>
+            <a:picLocks noChangeAspect="1"/>
+          </p:cNvPicPr>
+          <p:nvPr/>
+        </p:nvPicPr>
+        <p:blipFill>
+          <a:blip r:embed="rId5">
+            <a:extLst>
+              <a:ext uri="{28A0092B-C50C-407E-A947-70E740481C1C}">
+                <a14:useLocalDpi xmlns:a14="http://schemas.microsoft.com/office/drawing/2010/main" val="0"/>
+              </a:ext>
+            </a:extLst>
+          </a:blip>
+          <a:stretch>
+            <a:fillRect/>
+          </a:stretch>
+        </p:blipFill>
+        <p:spPr>
+          <a:xfrm>
+            <a:off x="337175" y="3791798"/>
+            <a:ext cx="2640103" cy="978862"/>
+          </a:xfrm>
+          <a:prstGeom prst="rect">
+            <a:avLst/>
+          </a:prstGeom>
+        </p:spPr>
+      </p:pic>
+      <p:pic>
+        <p:nvPicPr>
+          <p:cNvPr id="13" name="Picture 12" descr="A screen shot of a message&#10;&#10;Description automatically generated">
+            <a:extLst>
+              <a:ext uri="{FF2B5EF4-FFF2-40B4-BE49-F238E27FC236}">
+                <a16:creationId xmlns:a16="http://schemas.microsoft.com/office/drawing/2014/main" id="{06A9A314-DEB6-2580-7B1D-D459D2362683}"/>
+              </a:ext>
+            </a:extLst>
+          </p:cNvPr>
+          <p:cNvPicPr>
+            <a:picLocks noChangeAspect="1"/>
+          </p:cNvPicPr>
+          <p:nvPr/>
+        </p:nvPicPr>
+        <p:blipFill>
+          <a:blip r:embed="rId6">
+            <a:extLst>
+              <a:ext uri="{28A0092B-C50C-407E-A947-70E740481C1C}">
+                <a14:useLocalDpi xmlns:a14="http://schemas.microsoft.com/office/drawing/2010/main" val="0"/>
+              </a:ext>
+            </a:extLst>
+          </a:blip>
+          <a:stretch>
+            <a:fillRect/>
+          </a:stretch>
+        </p:blipFill>
+        <p:spPr>
+          <a:xfrm>
+            <a:off x="337175" y="5210911"/>
+            <a:ext cx="2732141" cy="1058084"/>
+          </a:xfrm>
+          <a:prstGeom prst="rect">
+            <a:avLst/>
+          </a:prstGeom>
+        </p:spPr>
+      </p:pic>
+      <p:cxnSp>
+        <p:nvCxnSpPr>
+          <p:cNvPr id="14" name="Straight Arrow Connector 13">
+            <a:extLst>
+              <a:ext uri="{FF2B5EF4-FFF2-40B4-BE49-F238E27FC236}">
+                <a16:creationId xmlns:a16="http://schemas.microsoft.com/office/drawing/2014/main" id="{C19F79FD-5589-4D8F-85BC-87150F426CEB}"/>
+              </a:ext>
+            </a:extLst>
+          </p:cNvPr>
+          <p:cNvCxnSpPr>
+            <a:cxnSpLocks/>
+          </p:cNvCxnSpPr>
+          <p:nvPr/>
+        </p:nvCxnSpPr>
+        <p:spPr>
+          <a:xfrm>
+            <a:off x="2059459" y="2617885"/>
+            <a:ext cx="2734963" cy="1173913"/>
+          </a:xfrm>
+          <a:prstGeom prst="straightConnector1">
+            <a:avLst/>
+          </a:prstGeom>
+          <a:ln>
+            <a:tailEnd type="triangle"/>
+          </a:ln>
+        </p:spPr>
+        <p:style>
+          <a:lnRef idx="1">
+            <a:schemeClr val="accent1"/>
+          </a:lnRef>
+          <a:fillRef idx="0">
+            <a:schemeClr val="accent1"/>
+          </a:fillRef>
+          <a:effectRef idx="0">
+            <a:schemeClr val="accent1"/>
+          </a:effectRef>
+          <a:fontRef idx="minor">
+            <a:schemeClr val="tx1"/>
+          </a:fontRef>
+        </p:style>
+      </p:cxnSp>
+      <p:cxnSp>
+        <p:nvCxnSpPr>
+          <p:cNvPr id="17" name="Straight Arrow Connector 16">
+            <a:extLst>
+              <a:ext uri="{FF2B5EF4-FFF2-40B4-BE49-F238E27FC236}">
+                <a16:creationId xmlns:a16="http://schemas.microsoft.com/office/drawing/2014/main" id="{4CA4D656-B3D6-EE7A-8240-200FDA53D505}"/>
+              </a:ext>
+            </a:extLst>
+          </p:cNvPr>
+          <p:cNvCxnSpPr>
+            <a:cxnSpLocks/>
+            <a:stCxn id="13" idx="0"/>
+          </p:cNvCxnSpPr>
+          <p:nvPr/>
+        </p:nvCxnSpPr>
+        <p:spPr>
+          <a:xfrm flipV="1">
+            <a:off x="1703246" y="3962400"/>
+            <a:ext cx="3033511" cy="1248511"/>
+          </a:xfrm>
+          <a:prstGeom prst="straightConnector1">
+            <a:avLst/>
+          </a:prstGeom>
+          <a:ln>
+            <a:tailEnd type="triangle"/>
+          </a:ln>
+        </p:spPr>
+        <p:style>
+          <a:lnRef idx="1">
+            <a:schemeClr val="accent1"/>
+          </a:lnRef>
+          <a:fillRef idx="0">
+            <a:schemeClr val="accent1"/>
+          </a:fillRef>
+          <a:effectRef idx="0">
+            <a:schemeClr val="accent1"/>
+          </a:effectRef>
+          <a:fontRef idx="minor">
+            <a:schemeClr val="tx1"/>
+          </a:fontRef>
+        </p:style>
+      </p:cxnSp>
+      <p:cxnSp>
+        <p:nvCxnSpPr>
+          <p:cNvPr id="20" name="Straight Arrow Connector 19">
+            <a:extLst>
+              <a:ext uri="{FF2B5EF4-FFF2-40B4-BE49-F238E27FC236}">
+                <a16:creationId xmlns:a16="http://schemas.microsoft.com/office/drawing/2014/main" id="{7C42555E-069D-6895-1CAA-43AAAB318965}"/>
+              </a:ext>
+            </a:extLst>
+          </p:cNvPr>
+          <p:cNvCxnSpPr>
+            <a:cxnSpLocks/>
+          </p:cNvCxnSpPr>
+          <p:nvPr/>
+        </p:nvCxnSpPr>
+        <p:spPr>
+          <a:xfrm>
+            <a:off x="1703246" y="3962400"/>
+            <a:ext cx="2761662" cy="0"/>
+          </a:xfrm>
+          <a:prstGeom prst="straightConnector1">
+            <a:avLst/>
+          </a:prstGeom>
+          <a:ln>
+            <a:tailEnd type="triangle"/>
+          </a:ln>
+        </p:spPr>
+        <p:style>
+          <a:lnRef idx="1">
+            <a:schemeClr val="accent1"/>
+          </a:lnRef>
+          <a:fillRef idx="0">
+            <a:schemeClr val="accent1"/>
+          </a:fillRef>
+          <a:effectRef idx="0">
+            <a:schemeClr val="accent1"/>
+          </a:effectRef>
+          <a:fontRef idx="minor">
+            <a:schemeClr val="tx1"/>
+          </a:fontRef>
+        </p:style>
+      </p:cxnSp>
+      <p:sp>
+        <p:nvSpPr>
+          <p:cNvPr id="23" name="TextBox 22">
+            <a:extLst>
+              <a:ext uri="{FF2B5EF4-FFF2-40B4-BE49-F238E27FC236}">
+                <a16:creationId xmlns:a16="http://schemas.microsoft.com/office/drawing/2014/main" id="{275A4D0A-DC8B-32B2-8D7B-837C6CF0E372}"/>
+              </a:ext>
+            </a:extLst>
+          </p:cNvPr>
+          <p:cNvSpPr txBox="1"/>
+          <p:nvPr/>
+        </p:nvSpPr>
+        <p:spPr>
+          <a:xfrm>
+            <a:off x="3426940" y="3000584"/>
+            <a:ext cx="1156355" cy="276999"/>
+          </a:xfrm>
+          <a:prstGeom prst="rect">
+            <a:avLst/>
+          </a:prstGeom>
+          <a:noFill/>
+        </p:spPr>
+        <p:txBody>
+          <a:bodyPr wrap="square" rtlCol="0">
+            <a:spAutoFit/>
+          </a:bodyPr>
+          <a:lstStyle/>
+          <a:p>
+            <a:r>
+              <a:rPr lang="en-US" sz="1200" dirty="0">
+                <a:latin typeface="Arial" panose="020B0604020202020204" pitchFamily="34" charset="0"/>
+                <a:cs typeface="Arial" panose="020B0604020202020204" pitchFamily="34" charset="0"/>
+              </a:rPr>
+              <a:t>implements</a:t>
+            </a:r>
+            <a:endParaRPr lang="bg-BG" sz="1200" dirty="0">
+              <a:latin typeface="Arial" panose="020B0604020202020204" pitchFamily="34" charset="0"/>
+              <a:cs typeface="Arial" panose="020B0604020202020204" pitchFamily="34" charset="0"/>
+            </a:endParaRPr>
+          </a:p>
+        </p:txBody>
+      </p:sp>
+      <p:sp>
+        <p:nvSpPr>
+          <p:cNvPr id="24" name="TextBox 23">
+            <a:extLst>
+              <a:ext uri="{FF2B5EF4-FFF2-40B4-BE49-F238E27FC236}">
+                <a16:creationId xmlns:a16="http://schemas.microsoft.com/office/drawing/2014/main" id="{52D71299-4A54-9DFE-D505-9CC2F08D5A21}"/>
+              </a:ext>
+            </a:extLst>
+          </p:cNvPr>
+          <p:cNvSpPr txBox="1"/>
+          <p:nvPr/>
+        </p:nvSpPr>
+        <p:spPr>
+          <a:xfrm>
+            <a:off x="3069497" y="4714757"/>
+            <a:ext cx="1156355" cy="276999"/>
+          </a:xfrm>
+          <a:prstGeom prst="rect">
+            <a:avLst/>
+          </a:prstGeom>
+          <a:noFill/>
+        </p:spPr>
+        <p:txBody>
+          <a:bodyPr wrap="square" rtlCol="0">
+            <a:spAutoFit/>
+          </a:bodyPr>
+          <a:lstStyle/>
+          <a:p>
+            <a:r>
+              <a:rPr lang="en-US" sz="1200" dirty="0">
+                <a:latin typeface="Arial" panose="020B0604020202020204" pitchFamily="34" charset="0"/>
+                <a:cs typeface="Arial" panose="020B0604020202020204" pitchFamily="34" charset="0"/>
+              </a:rPr>
+              <a:t>implements</a:t>
+            </a:r>
+            <a:endParaRPr lang="bg-BG" sz="1200" dirty="0">
+              <a:latin typeface="Arial" panose="020B0604020202020204" pitchFamily="34" charset="0"/>
+              <a:cs typeface="Arial" panose="020B0604020202020204" pitchFamily="34" charset="0"/>
+            </a:endParaRPr>
+          </a:p>
+        </p:txBody>
+      </p:sp>
+      <p:sp>
+        <p:nvSpPr>
+          <p:cNvPr id="26" name="TextBox 25">
+            <a:extLst>
+              <a:ext uri="{FF2B5EF4-FFF2-40B4-BE49-F238E27FC236}">
+                <a16:creationId xmlns:a16="http://schemas.microsoft.com/office/drawing/2014/main" id="{3B55B35B-3C3E-6D7A-64C3-E6BACCD98B4C}"/>
+              </a:ext>
+            </a:extLst>
+          </p:cNvPr>
+          <p:cNvSpPr txBox="1"/>
+          <p:nvPr/>
+        </p:nvSpPr>
+        <p:spPr>
+          <a:xfrm>
+            <a:off x="2460464" y="3950285"/>
+            <a:ext cx="1156355" cy="276999"/>
+          </a:xfrm>
+          <a:prstGeom prst="rect">
+            <a:avLst/>
+          </a:prstGeom>
+          <a:noFill/>
+        </p:spPr>
+        <p:txBody>
+          <a:bodyPr wrap="square" rtlCol="0">
+            <a:spAutoFit/>
+          </a:bodyPr>
+          <a:lstStyle/>
+          <a:p>
+            <a:r>
+              <a:rPr lang="en-US" sz="1200" dirty="0">
+                <a:latin typeface="Arial" panose="020B0604020202020204" pitchFamily="34" charset="0"/>
+                <a:cs typeface="Arial" panose="020B0604020202020204" pitchFamily="34" charset="0"/>
+              </a:rPr>
+              <a:t>implements</a:t>
+            </a:r>
+            <a:endParaRPr lang="bg-BG" sz="1200" dirty="0">
+              <a:latin typeface="Arial" panose="020B0604020202020204" pitchFamily="34" charset="0"/>
+              <a:cs typeface="Arial" panose="020B0604020202020204" pitchFamily="34" charset="0"/>
+            </a:endParaRPr>
+          </a:p>
+        </p:txBody>
+      </p:sp>
+    </p:spTree>
+    <p:extLst>
+      <p:ext uri="{BB962C8B-B14F-4D97-AF65-F5344CB8AC3E}">
+        <p14:creationId xmlns:p14="http://schemas.microsoft.com/office/powerpoint/2010/main" val="1592029572"/>
+      </p:ext>
+    </p:extLst>
+  </p:cSld>
+  <p:clrMapOvr>
+    <a:masterClrMapping/>
+  </p:clrMapOvr>
+</p:sld>
+</file>
+
 <file path=ppt/slides/slide2.xml><?xml version="1.0" encoding="utf-8"?>
 <p:sld xmlns:a="http://schemas.openxmlformats.org/drawingml/2006/main" xmlns:r="http://schemas.openxmlformats.org/officeDocument/2006/relationships" xmlns:p="http://schemas.openxmlformats.org/presentationml/2006/main">
   <p:cSld>
@@ -13812,7 +14327,7 @@
                 <a:latin typeface="Arial" panose="020B0604020202020204" pitchFamily="34" charset="0"/>
                 <a:cs typeface="Arial" panose="020B0604020202020204" pitchFamily="34" charset="0"/>
               </a:rPr>
-              <a:t>(Server Logging example)</a:t>
+              <a:t>(Server Logging)</a:t>
             </a:r>
             <a:endParaRPr lang="bg-BG" sz="3200" dirty="0">
               <a:latin typeface="Arial" panose="020B0604020202020204" pitchFamily="34" charset="0"/>
@@ -14016,7 +14531,7 @@
                 <a:latin typeface="Arial" panose="020B0604020202020204" pitchFamily="34" charset="0"/>
                 <a:cs typeface="Arial" panose="020B0604020202020204" pitchFamily="34" charset="0"/>
               </a:rPr>
-              <a:t>(Server Logging example)</a:t>
+              <a:t>(Server Logging)</a:t>
             </a:r>
             <a:endParaRPr lang="bg-BG" sz="3200" dirty="0"/>
           </a:p>
@@ -15849,6 +16364,226 @@
     <p:extLst>
       <p:ext uri="{BB962C8B-B14F-4D97-AF65-F5344CB8AC3E}">
         <p14:creationId xmlns:p14="http://schemas.microsoft.com/office/powerpoint/2010/main" val="4107333194"/>
+      </p:ext>
+    </p:extLst>
+  </p:cSld>
+  <p:clrMapOvr>
+    <a:masterClrMapping/>
+  </p:clrMapOvr>
+</p:sld>
+</file>
+
+<file path=ppt/slides/slide9.xml><?xml version="1.0" encoding="utf-8"?>
+<p:sld xmlns:a="http://schemas.openxmlformats.org/drawingml/2006/main" xmlns:r="http://schemas.openxmlformats.org/officeDocument/2006/relationships" xmlns:p="http://schemas.openxmlformats.org/presentationml/2006/main">
+  <p:cSld>
+    <p:spTree>
+      <p:nvGrpSpPr>
+        <p:cNvPr id="1" name=""/>
+        <p:cNvGrpSpPr/>
+        <p:nvPr/>
+      </p:nvGrpSpPr>
+      <p:grpSpPr>
+        <a:xfrm>
+          <a:off x="0" y="0"/>
+          <a:ext cx="0" cy="0"/>
+          <a:chOff x="0" y="0"/>
+          <a:chExt cx="0" cy="0"/>
+        </a:xfrm>
+      </p:grpSpPr>
+      <p:sp>
+        <p:nvSpPr>
+          <p:cNvPr id="2" name="Title 1">
+            <a:extLst>
+              <a:ext uri="{FF2B5EF4-FFF2-40B4-BE49-F238E27FC236}">
+                <a16:creationId xmlns:a16="http://schemas.microsoft.com/office/drawing/2014/main" id="{A8136A13-1CE3-5A89-2C87-19A9FA003965}"/>
+              </a:ext>
+            </a:extLst>
+          </p:cNvPr>
+          <p:cNvSpPr>
+            <a:spLocks noGrp="1"/>
+          </p:cNvSpPr>
+          <p:nvPr>
+            <p:ph type="title"/>
+          </p:nvPr>
+        </p:nvSpPr>
+        <p:spPr/>
+        <p:txBody>
+          <a:bodyPr/>
+          <a:lstStyle/>
+          <a:p>
+            <a:pPr algn="ctr"/>
+            <a:r>
+              <a:rPr lang="en-US" sz="3200" dirty="0">
+                <a:latin typeface="Arial" panose="020B0604020202020204" pitchFamily="34" charset="0"/>
+                <a:cs typeface="Arial" panose="020B0604020202020204" pitchFamily="34" charset="0"/>
+              </a:rPr>
+              <a:t>2. Tight Coupled Code </a:t>
+            </a:r>
+            <a:br>
+              <a:rPr lang="en-US" sz="3200" dirty="0">
+                <a:latin typeface="Arial" panose="020B0604020202020204" pitchFamily="34" charset="0"/>
+                <a:cs typeface="Arial" panose="020B0604020202020204" pitchFamily="34" charset="0"/>
+              </a:rPr>
+            </a:br>
+            <a:r>
+              <a:rPr lang="en-US" sz="3200" dirty="0">
+                <a:latin typeface="Arial" panose="020B0604020202020204" pitchFamily="34" charset="0"/>
+                <a:cs typeface="Arial" panose="020B0604020202020204" pitchFamily="34" charset="0"/>
+              </a:rPr>
+              <a:t>(Client Notifier)</a:t>
+            </a:r>
+            <a:endParaRPr lang="bg-BG" sz="3200" dirty="0"/>
+          </a:p>
+        </p:txBody>
+      </p:sp>
+      <p:pic>
+        <p:nvPicPr>
+          <p:cNvPr id="5" name="Picture 4" descr="A screenshot of a computer program&#10;&#10;Description automatically generated">
+            <a:extLst>
+              <a:ext uri="{FF2B5EF4-FFF2-40B4-BE49-F238E27FC236}">
+                <a16:creationId xmlns:a16="http://schemas.microsoft.com/office/drawing/2014/main" id="{1BAC6D1E-D972-2676-7F16-4849EC83B80B}"/>
+              </a:ext>
+            </a:extLst>
+          </p:cNvPr>
+          <p:cNvPicPr>
+            <a:picLocks noChangeAspect="1"/>
+          </p:cNvPicPr>
+          <p:nvPr/>
+        </p:nvPicPr>
+        <p:blipFill>
+          <a:blip r:embed="rId2">
+            <a:extLst>
+              <a:ext uri="{28A0092B-C50C-407E-A947-70E740481C1C}">
+                <a14:useLocalDpi xmlns:a14="http://schemas.microsoft.com/office/drawing/2010/main" val="0"/>
+              </a:ext>
+            </a:extLst>
+          </a:blip>
+          <a:stretch>
+            <a:fillRect/>
+          </a:stretch>
+        </p:blipFill>
+        <p:spPr>
+          <a:xfrm>
+            <a:off x="6981048" y="2335651"/>
+            <a:ext cx="4869602" cy="4328535"/>
+          </a:xfrm>
+          <a:prstGeom prst="rect">
+            <a:avLst/>
+          </a:prstGeom>
+        </p:spPr>
+      </p:pic>
+      <p:pic>
+        <p:nvPicPr>
+          <p:cNvPr id="7" name="Picture 6" descr="A screenshot of a chat&#10;&#10;Description automatically generated">
+            <a:extLst>
+              <a:ext uri="{FF2B5EF4-FFF2-40B4-BE49-F238E27FC236}">
+                <a16:creationId xmlns:a16="http://schemas.microsoft.com/office/drawing/2014/main" id="{4EA976F1-94FE-4663-31A3-888A861EC23D}"/>
+              </a:ext>
+            </a:extLst>
+          </p:cNvPr>
+          <p:cNvPicPr>
+            <a:picLocks noChangeAspect="1"/>
+          </p:cNvPicPr>
+          <p:nvPr/>
+        </p:nvPicPr>
+        <p:blipFill>
+          <a:blip r:embed="rId3">
+            <a:extLst>
+              <a:ext uri="{28A0092B-C50C-407E-A947-70E740481C1C}">
+                <a14:useLocalDpi xmlns:a14="http://schemas.microsoft.com/office/drawing/2010/main" val="0"/>
+              </a:ext>
+            </a:extLst>
+          </a:blip>
+          <a:stretch>
+            <a:fillRect/>
+          </a:stretch>
+        </p:blipFill>
+        <p:spPr>
+          <a:xfrm>
+            <a:off x="535275" y="2427327"/>
+            <a:ext cx="3361573" cy="1230575"/>
+          </a:xfrm>
+          <a:prstGeom prst="rect">
+            <a:avLst/>
+          </a:prstGeom>
+        </p:spPr>
+      </p:pic>
+      <p:pic>
+        <p:nvPicPr>
+          <p:cNvPr id="9" name="Picture 8" descr="A screen shot of a computer&#10;&#10;Description automatically generated">
+            <a:extLst>
+              <a:ext uri="{FF2B5EF4-FFF2-40B4-BE49-F238E27FC236}">
+                <a16:creationId xmlns:a16="http://schemas.microsoft.com/office/drawing/2014/main" id="{6EEC3420-8D8C-C9BA-A120-D0980B977AA1}"/>
+              </a:ext>
+            </a:extLst>
+          </p:cNvPr>
+          <p:cNvPicPr>
+            <a:picLocks noChangeAspect="1"/>
+          </p:cNvPicPr>
+          <p:nvPr/>
+        </p:nvPicPr>
+        <p:blipFill>
+          <a:blip r:embed="rId4">
+            <a:extLst>
+              <a:ext uri="{28A0092B-C50C-407E-A947-70E740481C1C}">
+                <a14:useLocalDpi xmlns:a14="http://schemas.microsoft.com/office/drawing/2010/main" val="0"/>
+              </a:ext>
+            </a:extLst>
+          </a:blip>
+          <a:stretch>
+            <a:fillRect/>
+          </a:stretch>
+        </p:blipFill>
+        <p:spPr>
+          <a:xfrm>
+            <a:off x="539170" y="5288810"/>
+            <a:ext cx="3266519" cy="1375376"/>
+          </a:xfrm>
+          <a:prstGeom prst="rect">
+            <a:avLst/>
+          </a:prstGeom>
+        </p:spPr>
+      </p:pic>
+      <p:pic>
+        <p:nvPicPr>
+          <p:cNvPr id="11" name="Picture 10" descr="A screenshot of a computer&#10;&#10;Description automatically generated">
+            <a:extLst>
+              <a:ext uri="{FF2B5EF4-FFF2-40B4-BE49-F238E27FC236}">
+                <a16:creationId xmlns:a16="http://schemas.microsoft.com/office/drawing/2014/main" id="{5809288B-716C-51CC-6BA6-CDC3BA20D6C0}"/>
+              </a:ext>
+            </a:extLst>
+          </p:cNvPr>
+          <p:cNvPicPr>
+            <a:picLocks noChangeAspect="1"/>
+          </p:cNvPicPr>
+          <p:nvPr/>
+        </p:nvPicPr>
+        <p:blipFill>
+          <a:blip r:embed="rId5">
+            <a:extLst>
+              <a:ext uri="{28A0092B-C50C-407E-A947-70E740481C1C}">
+                <a14:useLocalDpi xmlns:a14="http://schemas.microsoft.com/office/drawing/2010/main" val="0"/>
+              </a:ext>
+            </a:extLst>
+          </a:blip>
+          <a:stretch>
+            <a:fillRect/>
+          </a:stretch>
+        </p:blipFill>
+        <p:spPr>
+          <a:xfrm>
+            <a:off x="3313104" y="3746806"/>
+            <a:ext cx="3089708" cy="1375376"/>
+          </a:xfrm>
+          <a:prstGeom prst="rect">
+            <a:avLst/>
+          </a:prstGeom>
+        </p:spPr>
+      </p:pic>
+    </p:spTree>
+    <p:extLst>
+      <p:ext uri="{BB962C8B-B14F-4D97-AF65-F5344CB8AC3E}">
+        <p14:creationId xmlns:p14="http://schemas.microsoft.com/office/powerpoint/2010/main" val="403001632"/>
       </p:ext>
     </p:extLst>
   </p:cSld>

</xml_diff>

<commit_message>
Slight updates in presentation
</commit_message>
<xml_diff>
--- a/Dependency Injection.pptx
+++ b/Dependency Injection.pptx
@@ -14539,42 +14539,6 @@
       </p:sp>
       <p:pic>
         <p:nvPicPr>
-          <p:cNvPr id="7" name="Picture 6" descr="A screenshot of a computer program&#10;&#10;Description automatically generated">
-            <a:extLst>
-              <a:ext uri="{FF2B5EF4-FFF2-40B4-BE49-F238E27FC236}">
-                <a16:creationId xmlns:a16="http://schemas.microsoft.com/office/drawing/2014/main" id="{940B8D8B-C12D-6D64-46E8-71EA45E9FB0B}"/>
-              </a:ext>
-            </a:extLst>
-          </p:cNvPr>
-          <p:cNvPicPr>
-            <a:picLocks noChangeAspect="1"/>
-          </p:cNvPicPr>
-          <p:nvPr/>
-        </p:nvPicPr>
-        <p:blipFill>
-          <a:blip r:embed="rId2">
-            <a:extLst>
-              <a:ext uri="{28A0092B-C50C-407E-A947-70E740481C1C}">
-                <a14:useLocalDpi xmlns:a14="http://schemas.microsoft.com/office/drawing/2010/main" val="0"/>
-              </a:ext>
-            </a:extLst>
-          </a:blip>
-          <a:stretch>
-            <a:fillRect/>
-          </a:stretch>
-        </p:blipFill>
-        <p:spPr>
-          <a:xfrm>
-            <a:off x="7923917" y="2866550"/>
-            <a:ext cx="3741744" cy="3017782"/>
-          </a:xfrm>
-          <a:prstGeom prst="rect">
-            <a:avLst/>
-          </a:prstGeom>
-        </p:spPr>
-      </p:pic>
-      <p:pic>
-        <p:nvPicPr>
           <p:cNvPr id="13" name="Picture 12" descr="A screen shot of a computer code&#10;&#10;Description automatically generated">
             <a:extLst>
               <a:ext uri="{FF2B5EF4-FFF2-40B4-BE49-F238E27FC236}">
@@ -14588,7 +14552,7 @@
           <p:nvPr/>
         </p:nvPicPr>
         <p:blipFill>
-          <a:blip r:embed="rId3">
+          <a:blip r:embed="rId2">
             <a:extLst>
               <a:ext uri="{28A0092B-C50C-407E-A947-70E740481C1C}">
                 <a14:useLocalDpi xmlns:a14="http://schemas.microsoft.com/office/drawing/2010/main" val="0"/>
@@ -14624,7 +14588,7 @@
           <p:nvPr/>
         </p:nvPicPr>
         <p:blipFill>
-          <a:blip r:embed="rId4">
+          <a:blip r:embed="rId3">
             <a:extLst>
               <a:ext uri="{28A0092B-C50C-407E-A947-70E740481C1C}">
                 <a14:useLocalDpi xmlns:a14="http://schemas.microsoft.com/office/drawing/2010/main" val="0"/>
@@ -14637,7 +14601,7 @@
         </p:blipFill>
         <p:spPr>
           <a:xfrm>
-            <a:off x="4545360" y="3586593"/>
+            <a:off x="4655695" y="3586593"/>
             <a:ext cx="2880610" cy="1036410"/>
           </a:xfrm>
           <a:prstGeom prst="rect">
@@ -14743,8 +14707,8 @@
         </p:nvCxnSpPr>
         <p:spPr>
           <a:xfrm flipV="1">
-            <a:off x="6767562" y="3505508"/>
-            <a:ext cx="2117124" cy="303613"/>
+            <a:off x="7003171" y="3086637"/>
+            <a:ext cx="2239683" cy="570678"/>
           </a:xfrm>
           <a:prstGeom prst="straightConnector1">
             <a:avLst/>
@@ -14866,7 +14830,7 @@
         </p:nvSpPr>
         <p:spPr>
           <a:xfrm>
-            <a:off x="10112078" y="2585739"/>
+            <a:off x="10120315" y="2250445"/>
             <a:ext cx="1666016" cy="276999"/>
           </a:xfrm>
           <a:prstGeom prst="rect">
@@ -14894,48 +14858,6 @@
           </a:p>
         </p:txBody>
       </p:sp>
-      <p:cxnSp>
-        <p:nvCxnSpPr>
-          <p:cNvPr id="33" name="Straight Arrow Connector 32">
-            <a:extLst>
-              <a:ext uri="{FF2B5EF4-FFF2-40B4-BE49-F238E27FC236}">
-                <a16:creationId xmlns:a16="http://schemas.microsoft.com/office/drawing/2014/main" id="{73668F9F-280A-82C0-1C95-92B2C7FE4905}"/>
-              </a:ext>
-            </a:extLst>
-          </p:cNvPr>
-          <p:cNvCxnSpPr>
-            <a:cxnSpLocks/>
-            <a:stCxn id="32" idx="2"/>
-          </p:cNvCxnSpPr>
-          <p:nvPr/>
-        </p:nvCxnSpPr>
-        <p:spPr>
-          <a:xfrm flipH="1">
-            <a:off x="10214919" y="2862738"/>
-            <a:ext cx="730167" cy="794577"/>
-          </a:xfrm>
-          <a:prstGeom prst="straightConnector1">
-            <a:avLst/>
-          </a:prstGeom>
-          <a:ln>
-            <a:tailEnd type="triangle"/>
-          </a:ln>
-        </p:spPr>
-        <p:style>
-          <a:lnRef idx="1">
-            <a:schemeClr val="accent1"/>
-          </a:lnRef>
-          <a:fillRef idx="0">
-            <a:schemeClr val="accent1"/>
-          </a:fillRef>
-          <a:effectRef idx="0">
-            <a:schemeClr val="accent1"/>
-          </a:effectRef>
-          <a:fontRef idx="minor">
-            <a:schemeClr val="tx1"/>
-          </a:fontRef>
-        </p:style>
-      </p:cxnSp>
       <p:sp>
         <p:nvSpPr>
           <p:cNvPr id="36" name="TextBox 35">
@@ -15061,7 +14983,7 @@
           <p:nvPr/>
         </p:nvPicPr>
         <p:blipFill>
-          <a:blip r:embed="rId5">
+          <a:blip r:embed="rId4">
             <a:extLst>
               <a:ext uri="{28A0092B-C50C-407E-A947-70E740481C1C}">
                 <a14:useLocalDpi xmlns:a14="http://schemas.microsoft.com/office/drawing/2010/main" val="0"/>
@@ -15082,6 +15004,83 @@
           </a:prstGeom>
         </p:spPr>
       </p:pic>
+      <p:pic>
+        <p:nvPicPr>
+          <p:cNvPr id="4" name="Picture 3" descr="A computer screen shot of text&#10;&#10;Description automatically generated">
+            <a:extLst>
+              <a:ext uri="{FF2B5EF4-FFF2-40B4-BE49-F238E27FC236}">
+                <a16:creationId xmlns:a16="http://schemas.microsoft.com/office/drawing/2014/main" id="{74488E16-F481-B7DC-D7E6-92F49F633EC6}"/>
+              </a:ext>
+            </a:extLst>
+          </p:cNvPr>
+          <p:cNvPicPr>
+            <a:picLocks noChangeAspect="1"/>
+          </p:cNvPicPr>
+          <p:nvPr/>
+        </p:nvPicPr>
+        <p:blipFill>
+          <a:blip r:embed="rId5">
+            <a:extLst>
+              <a:ext uri="{28A0092B-C50C-407E-A947-70E740481C1C}">
+                <a14:useLocalDpi xmlns:a14="http://schemas.microsoft.com/office/drawing/2010/main" val="0"/>
+              </a:ext>
+            </a:extLst>
+          </a:blip>
+          <a:stretch>
+            <a:fillRect/>
+          </a:stretch>
+        </p:blipFill>
+        <p:spPr>
+          <a:xfrm>
+            <a:off x="7705574" y="2565231"/>
+            <a:ext cx="4290299" cy="3226589"/>
+          </a:xfrm>
+          <a:prstGeom prst="rect">
+            <a:avLst/>
+          </a:prstGeom>
+        </p:spPr>
+      </p:pic>
+      <p:cxnSp>
+        <p:nvCxnSpPr>
+          <p:cNvPr id="9" name="Straight Arrow Connector 8">
+            <a:extLst>
+              <a:ext uri="{FF2B5EF4-FFF2-40B4-BE49-F238E27FC236}">
+                <a16:creationId xmlns:a16="http://schemas.microsoft.com/office/drawing/2014/main" id="{8136BFA6-963B-EEB3-30CE-8B6466BCC4CC}"/>
+              </a:ext>
+            </a:extLst>
+          </p:cNvPr>
+          <p:cNvCxnSpPr>
+            <a:cxnSpLocks/>
+          </p:cNvCxnSpPr>
+          <p:nvPr/>
+        </p:nvCxnSpPr>
+        <p:spPr>
+          <a:xfrm flipH="1">
+            <a:off x="9933569" y="2657299"/>
+            <a:ext cx="660290" cy="835544"/>
+          </a:xfrm>
+          <a:prstGeom prst="straightConnector1">
+            <a:avLst/>
+          </a:prstGeom>
+          <a:ln>
+            <a:tailEnd type="triangle"/>
+          </a:ln>
+        </p:spPr>
+        <p:style>
+          <a:lnRef idx="1">
+            <a:schemeClr val="accent1"/>
+          </a:lnRef>
+          <a:fillRef idx="0">
+            <a:schemeClr val="accent1"/>
+          </a:fillRef>
+          <a:effectRef idx="0">
+            <a:schemeClr val="accent1"/>
+          </a:effectRef>
+          <a:fontRef idx="minor">
+            <a:schemeClr val="tx1"/>
+          </a:fontRef>
+        </p:style>
+      </p:cxnSp>
     </p:spTree>
     <p:extLst>
       <p:ext uri="{BB962C8B-B14F-4D97-AF65-F5344CB8AC3E}">

</xml_diff>

<commit_message>
Fix project example numbers
</commit_message>
<xml_diff>
--- a/Dependency Injection.pptx
+++ b/Dependency Injection.pptx
@@ -13529,11 +13529,18 @@
           <a:p>
             <a:pPr algn="ctr"/>
             <a:r>
+              <a:rPr lang="bg-BG" dirty="0">
+                <a:latin typeface="Arial" panose="020B0604020202020204" pitchFamily="34" charset="0"/>
+                <a:cs typeface="Arial" panose="020B0604020202020204" pitchFamily="34" charset="0"/>
+              </a:rPr>
+              <a:t>4</a:t>
+            </a:r>
+            <a:r>
               <a:rPr lang="en-US" sz="3600" dirty="0">
                 <a:latin typeface="Arial" panose="020B0604020202020204" pitchFamily="34" charset="0"/>
                 <a:cs typeface="Arial" panose="020B0604020202020204" pitchFamily="34" charset="0"/>
               </a:rPr>
-              <a:t>2. </a:t>
+              <a:t>. </a:t>
             </a:r>
             <a:r>
               <a:rPr lang="en-US" sz="3200" dirty="0">
@@ -15838,11 +15845,18 @@
           <a:p>
             <a:pPr algn="ctr"/>
             <a:r>
+              <a:rPr lang="bg-BG" sz="3200" dirty="0">
+                <a:latin typeface="Arial" panose="020B0604020202020204" pitchFamily="34" charset="0"/>
+                <a:cs typeface="Arial" panose="020B0604020202020204" pitchFamily="34" charset="0"/>
+              </a:rPr>
+              <a:t>3</a:t>
+            </a:r>
+            <a:r>
               <a:rPr lang="en-US" sz="3200" dirty="0">
                 <a:latin typeface="Arial" panose="020B0604020202020204" pitchFamily="34" charset="0"/>
                 <a:cs typeface="Arial" panose="020B0604020202020204" pitchFamily="34" charset="0"/>
               </a:rPr>
-              <a:t>2. Tight Coupled Code </a:t>
+              <a:t>. Tight Coupled Code </a:t>
             </a:r>
             <a:br>
               <a:rPr lang="en-US" sz="3200" dirty="0">
@@ -16062,11 +16076,18 @@
           <a:p>
             <a:pPr algn="ctr"/>
             <a:r>
+              <a:rPr lang="bg-BG" sz="3200" dirty="0">
+                <a:latin typeface="Arial" panose="020B0604020202020204" pitchFamily="34" charset="0"/>
+                <a:cs typeface="Arial" panose="020B0604020202020204" pitchFamily="34" charset="0"/>
+              </a:rPr>
+              <a:t>3</a:t>
+            </a:r>
+            <a:r>
               <a:rPr lang="en-US" sz="3200" dirty="0">
                 <a:latin typeface="Arial" panose="020B0604020202020204" pitchFamily="34" charset="0"/>
                 <a:cs typeface="Arial" panose="020B0604020202020204" pitchFamily="34" charset="0"/>
               </a:rPr>
-              <a:t>2. Loose Coupled Code </a:t>
+              <a:t>. Loose Coupled Code </a:t>
             </a:r>
             <a:br>
               <a:rPr lang="en-US" sz="3200" dirty="0">
@@ -16412,11 +16433,18 @@
           <a:p>
             <a:pPr algn="ctr"/>
             <a:r>
+              <a:rPr lang="bg-BG" sz="3200" dirty="0">
+                <a:latin typeface="Arial" panose="020B0604020202020204" pitchFamily="34" charset="0"/>
+                <a:cs typeface="Arial" panose="020B0604020202020204" pitchFamily="34" charset="0"/>
+              </a:rPr>
+              <a:t>4</a:t>
+            </a:r>
+            <a:r>
               <a:rPr lang="en-US" sz="3200" dirty="0">
                 <a:latin typeface="Arial" panose="020B0604020202020204" pitchFamily="34" charset="0"/>
                 <a:cs typeface="Arial" panose="020B0604020202020204" pitchFamily="34" charset="0"/>
               </a:rPr>
-              <a:t>2. Tight Coupled Code </a:t>
+              <a:t>. Tight Coupled Code </a:t>
             </a:r>
             <a:br>
               <a:rPr lang="en-US" sz="3200" dirty="0">

</xml_diff>

<commit_message>
Add Suggestions slide for using of DI
</commit_message>
<xml_diff>
--- a/Dependency Injection.pptx
+++ b/Dependency Injection.pptx
@@ -15,6 +15,7 @@
     <p:sldId id="264" r:id="rId9"/>
     <p:sldId id="265" r:id="rId10"/>
     <p:sldId id="266" r:id="rId11"/>
+    <p:sldId id="267" r:id="rId12"/>
   </p:sldIdLst>
   <p:sldSz cx="12192000" cy="6858000"/>
   <p:notesSz cx="6858000" cy="9144000"/>
@@ -456,7 +457,7 @@
           <a:p>
             <a:fld id="{1F96FA68-E941-49B7-BC22-BB40477D0799}" type="datetimeFigureOut">
               <a:rPr lang="bg-BG" smtClean="0"/>
-              <a:t>31.5.2024 г.</a:t>
+              <a:t>1.6.2024 г.</a:t>
             </a:fld>
             <a:endParaRPr lang="bg-BG"/>
           </a:p>
@@ -1544,7 +1545,7 @@
           <a:p>
             <a:fld id="{1F96FA68-E941-49B7-BC22-BB40477D0799}" type="datetimeFigureOut">
               <a:rPr lang="bg-BG" smtClean="0"/>
-              <a:t>31.5.2024 г.</a:t>
+              <a:t>1.6.2024 г.</a:t>
             </a:fld>
             <a:endParaRPr lang="bg-BG"/>
           </a:p>
@@ -2524,7 +2525,7 @@
           <a:p>
             <a:fld id="{1F96FA68-E941-49B7-BC22-BB40477D0799}" type="datetimeFigureOut">
               <a:rPr lang="bg-BG" smtClean="0"/>
-              <a:t>31.5.2024 г.</a:t>
+              <a:t>1.6.2024 г.</a:t>
             </a:fld>
             <a:endParaRPr lang="bg-BG"/>
           </a:p>
@@ -3658,7 +3659,7 @@
           <a:p>
             <a:fld id="{1F96FA68-E941-49B7-BC22-BB40477D0799}" type="datetimeFigureOut">
               <a:rPr lang="bg-BG" smtClean="0"/>
-              <a:t>31.5.2024 г.</a:t>
+              <a:t>1.6.2024 г.</a:t>
             </a:fld>
             <a:endParaRPr lang="bg-BG"/>
           </a:p>
@@ -4691,7 +4692,7 @@
           <a:p>
             <a:fld id="{1F96FA68-E941-49B7-BC22-BB40477D0799}" type="datetimeFigureOut">
               <a:rPr lang="bg-BG" smtClean="0"/>
-              <a:t>31.5.2024 г.</a:t>
+              <a:t>1.6.2024 г.</a:t>
             </a:fld>
             <a:endParaRPr lang="bg-BG"/>
           </a:p>
@@ -5351,7 +5352,7 @@
           <a:p>
             <a:fld id="{1F96FA68-E941-49B7-BC22-BB40477D0799}" type="datetimeFigureOut">
               <a:rPr lang="bg-BG" smtClean="0"/>
-              <a:t>31.5.2024 г.</a:t>
+              <a:t>1.6.2024 г.</a:t>
             </a:fld>
             <a:endParaRPr lang="bg-BG"/>
           </a:p>
@@ -6212,7 +6213,7 @@
           <a:p>
             <a:fld id="{1F96FA68-E941-49B7-BC22-BB40477D0799}" type="datetimeFigureOut">
               <a:rPr lang="bg-BG" smtClean="0"/>
-              <a:t>31.5.2024 г.</a:t>
+              <a:t>1.6.2024 г.</a:t>
             </a:fld>
             <a:endParaRPr lang="bg-BG"/>
           </a:p>
@@ -6402,7 +6403,7 @@
           <a:p>
             <a:fld id="{1F96FA68-E941-49B7-BC22-BB40477D0799}" type="datetimeFigureOut">
               <a:rPr lang="bg-BG" smtClean="0"/>
-              <a:t>31.5.2024 г.</a:t>
+              <a:t>1.6.2024 г.</a:t>
             </a:fld>
             <a:endParaRPr lang="bg-BG"/>
           </a:p>
@@ -7374,7 +7375,7 @@
           <a:p>
             <a:fld id="{1F96FA68-E941-49B7-BC22-BB40477D0799}" type="datetimeFigureOut">
               <a:rPr lang="bg-BG" smtClean="0"/>
-              <a:t>31.5.2024 г.</a:t>
+              <a:t>1.6.2024 г.</a:t>
             </a:fld>
             <a:endParaRPr lang="bg-BG"/>
           </a:p>
@@ -7585,7 +7586,7 @@
           <a:p>
             <a:fld id="{1F96FA68-E941-49B7-BC22-BB40477D0799}" type="datetimeFigureOut">
               <a:rPr lang="bg-BG" smtClean="0"/>
-              <a:t>31.5.2024 г.</a:t>
+              <a:t>1.6.2024 г.</a:t>
             </a:fld>
             <a:endParaRPr lang="bg-BG"/>
           </a:p>
@@ -8619,7 +8620,7 @@
           <a:p>
             <a:fld id="{1F96FA68-E941-49B7-BC22-BB40477D0799}" type="datetimeFigureOut">
               <a:rPr lang="bg-BG" smtClean="0"/>
-              <a:t>31.5.2024 г.</a:t>
+              <a:t>1.6.2024 г.</a:t>
             </a:fld>
             <a:endParaRPr lang="bg-BG"/>
           </a:p>
@@ -8891,7 +8892,7 @@
           <a:p>
             <a:fld id="{1F96FA68-E941-49B7-BC22-BB40477D0799}" type="datetimeFigureOut">
               <a:rPr lang="bg-BG" smtClean="0"/>
-              <a:t>31.5.2024 г.</a:t>
+              <a:t>1.6.2024 г.</a:t>
             </a:fld>
             <a:endParaRPr lang="bg-BG"/>
           </a:p>
@@ -9301,7 +9302,7 @@
           <a:p>
             <a:fld id="{1F96FA68-E941-49B7-BC22-BB40477D0799}" type="datetimeFigureOut">
               <a:rPr lang="bg-BG" smtClean="0"/>
-              <a:t>31.5.2024 г.</a:t>
+              <a:t>1.6.2024 г.</a:t>
             </a:fld>
             <a:endParaRPr lang="bg-BG"/>
           </a:p>
@@ -9428,7 +9429,7 @@
           <a:p>
             <a:fld id="{1F96FA68-E941-49B7-BC22-BB40477D0799}" type="datetimeFigureOut">
               <a:rPr lang="bg-BG" smtClean="0"/>
-              <a:t>31.5.2024 г.</a:t>
+              <a:t>1.6.2024 г.</a:t>
             </a:fld>
             <a:endParaRPr lang="bg-BG"/>
           </a:p>
@@ -9523,7 +9524,7 @@
           <a:p>
             <a:fld id="{1F96FA68-E941-49B7-BC22-BB40477D0799}" type="datetimeFigureOut">
               <a:rPr lang="bg-BG" smtClean="0"/>
-              <a:t>31.5.2024 г.</a:t>
+              <a:t>1.6.2024 г.</a:t>
             </a:fld>
             <a:endParaRPr lang="bg-BG"/>
           </a:p>
@@ -10604,7 +10605,7 @@
           <a:p>
             <a:fld id="{1F96FA68-E941-49B7-BC22-BB40477D0799}" type="datetimeFigureOut">
               <a:rPr lang="bg-BG" smtClean="0"/>
-              <a:t>31.5.2024 г.</a:t>
+              <a:t>1.6.2024 г.</a:t>
             </a:fld>
             <a:endParaRPr lang="bg-BG"/>
           </a:p>
@@ -11712,7 +11713,7 @@
           <a:p>
             <a:fld id="{1F96FA68-E941-49B7-BC22-BB40477D0799}" type="datetimeFigureOut">
               <a:rPr lang="bg-BG" smtClean="0"/>
-              <a:t>31.5.2024 г.</a:t>
+              <a:t>1.6.2024 г.</a:t>
             </a:fld>
             <a:endParaRPr lang="bg-BG"/>
           </a:p>
@@ -12709,7 +12710,7 @@
           <a:p>
             <a:fld id="{1F96FA68-E941-49B7-BC22-BB40477D0799}" type="datetimeFigureOut">
               <a:rPr lang="bg-BG" smtClean="0"/>
-              <a:t>31.5.2024 г.</a:t>
+              <a:t>1.6.2024 г.</a:t>
             </a:fld>
             <a:endParaRPr lang="bg-BG"/>
           </a:p>
@@ -14009,6 +14010,139 @@
 </p:sld>
 </file>
 
+<file path=ppt/slides/slide11.xml><?xml version="1.0" encoding="utf-8"?>
+<p:sld xmlns:a="http://schemas.openxmlformats.org/drawingml/2006/main" xmlns:r="http://schemas.openxmlformats.org/officeDocument/2006/relationships" xmlns:p="http://schemas.openxmlformats.org/presentationml/2006/main">
+  <p:cSld>
+    <p:spTree>
+      <p:nvGrpSpPr>
+        <p:cNvPr id="1" name=""/>
+        <p:cNvGrpSpPr/>
+        <p:nvPr/>
+      </p:nvGrpSpPr>
+      <p:grpSpPr>
+        <a:xfrm>
+          <a:off x="0" y="0"/>
+          <a:ext cx="0" cy="0"/>
+          <a:chOff x="0" y="0"/>
+          <a:chExt cx="0" cy="0"/>
+        </a:xfrm>
+      </p:grpSpPr>
+      <p:sp>
+        <p:nvSpPr>
+          <p:cNvPr id="2" name="Title 1">
+            <a:extLst>
+              <a:ext uri="{FF2B5EF4-FFF2-40B4-BE49-F238E27FC236}">
+                <a16:creationId xmlns:a16="http://schemas.microsoft.com/office/drawing/2014/main" id="{8530DE2C-622C-5680-7722-986859E57600}"/>
+              </a:ext>
+            </a:extLst>
+          </p:cNvPr>
+          <p:cNvSpPr>
+            <a:spLocks noGrp="1"/>
+          </p:cNvSpPr>
+          <p:nvPr>
+            <p:ph type="title"/>
+          </p:nvPr>
+        </p:nvSpPr>
+        <p:spPr/>
+        <p:txBody>
+          <a:bodyPr/>
+          <a:lstStyle/>
+          <a:p>
+            <a:pPr algn="ctr"/>
+            <a:r>
+              <a:rPr lang="en-US" dirty="0">
+                <a:latin typeface="Arial" panose="020B0604020202020204" pitchFamily="34" charset="0"/>
+                <a:cs typeface="Arial" panose="020B0604020202020204" pitchFamily="34" charset="0"/>
+              </a:rPr>
+              <a:t>Suggestions</a:t>
+            </a:r>
+            <a:endParaRPr lang="bg-BG" dirty="0">
+              <a:latin typeface="Arial" panose="020B0604020202020204" pitchFamily="34" charset="0"/>
+              <a:cs typeface="Arial" panose="020B0604020202020204" pitchFamily="34" charset="0"/>
+            </a:endParaRPr>
+          </a:p>
+        </p:txBody>
+      </p:sp>
+      <p:sp>
+        <p:nvSpPr>
+          <p:cNvPr id="3" name="Content Placeholder 2">
+            <a:extLst>
+              <a:ext uri="{FF2B5EF4-FFF2-40B4-BE49-F238E27FC236}">
+                <a16:creationId xmlns:a16="http://schemas.microsoft.com/office/drawing/2014/main" id="{A9F522C2-265F-2F7B-19C2-E7F433628BA8}"/>
+              </a:ext>
+            </a:extLst>
+          </p:cNvPr>
+          <p:cNvSpPr>
+            <a:spLocks noGrp="1"/>
+          </p:cNvSpPr>
+          <p:nvPr>
+            <p:ph idx="1"/>
+          </p:nvPr>
+        </p:nvSpPr>
+        <p:spPr/>
+        <p:txBody>
+          <a:bodyPr/>
+          <a:lstStyle/>
+          <a:p>
+            <a:r>
+              <a:rPr lang="en-US" dirty="0">
+                <a:latin typeface="Arial" panose="020B0604020202020204" pitchFamily="34" charset="0"/>
+                <a:cs typeface="Arial" panose="020B0604020202020204" pitchFamily="34" charset="0"/>
+              </a:rPr>
+              <a:t>If your project is not started with DI and is not so big, change it to support Dependency Injection. This will give you easier times when the project grows, and your architecture will be better. The code will become testable as well.</a:t>
+            </a:r>
+          </a:p>
+          <a:p>
+            <a:r>
+              <a:rPr lang="en-US" dirty="0">
+                <a:latin typeface="Arial" panose="020B0604020202020204" pitchFamily="34" charset="0"/>
+                <a:cs typeface="Arial" panose="020B0604020202020204" pitchFamily="34" charset="0"/>
+              </a:rPr>
+              <a:t>If you start a new project, have in mind how the code will be extended, maintained and tested. This will help you to design your application. For sure use Dependency Injection. Some engineers use Test Driven Development (TDD).</a:t>
+            </a:r>
+          </a:p>
+          <a:p>
+            <a:r>
+              <a:rPr lang="en-US" dirty="0">
+                <a:latin typeface="Arial" panose="020B0604020202020204" pitchFamily="34" charset="0"/>
+                <a:cs typeface="Arial" panose="020B0604020202020204" pitchFamily="34" charset="0"/>
+              </a:rPr>
+              <a:t>If your application is not very small use DI Container framework like </a:t>
+            </a:r>
+            <a:r>
+              <a:rPr lang="en-US" b="1" dirty="0" err="1">
+                <a:latin typeface="Arial" panose="020B0604020202020204" pitchFamily="34" charset="0"/>
+                <a:cs typeface="Arial" panose="020B0604020202020204" pitchFamily="34" charset="0"/>
+              </a:rPr>
+              <a:t>Autofac</a:t>
+            </a:r>
+            <a:r>
+              <a:rPr lang="en-US" dirty="0">
+                <a:latin typeface="Arial" panose="020B0604020202020204" pitchFamily="34" charset="0"/>
+                <a:cs typeface="Arial" panose="020B0604020202020204" pitchFamily="34" charset="0"/>
+              </a:rPr>
+              <a:t> or some other framework. .NET has also build in light weight DI Container. The DI Container will help you to resolve your dependencies and to do not make complex, and at some point, unmaintainable dependency graph.</a:t>
+            </a:r>
+            <a:endParaRPr lang="bg-BG" dirty="0">
+              <a:latin typeface="Arial" panose="020B0604020202020204" pitchFamily="34" charset="0"/>
+              <a:cs typeface="Arial" panose="020B0604020202020204" pitchFamily="34" charset="0"/>
+            </a:endParaRPr>
+          </a:p>
+        </p:txBody>
+      </p:sp>
+    </p:spTree>
+    <p:extLst>
+      <p:ext uri="{BB962C8B-B14F-4D97-AF65-F5344CB8AC3E}">
+        <p14:creationId xmlns:p14="http://schemas.microsoft.com/office/powerpoint/2010/main" val="3779998638"/>
+      </p:ext>
+    </p:extLst>
+  </p:cSld>
+  <p:clrMapOvr>
+    <a:masterClrMapping/>
+  </p:clrMapOvr>
+</p:sld>
+</file>
+
 <file path=ppt/slides/slide2.xml><?xml version="1.0" encoding="utf-8"?>
 <p:sld xmlns:a="http://schemas.openxmlformats.org/drawingml/2006/main" xmlns:r="http://schemas.openxmlformats.org/officeDocument/2006/relationships" xmlns:p="http://schemas.openxmlformats.org/presentationml/2006/main">
   <p:cSld>

</xml_diff>

<commit_message>
Add new slide for Tight Coupled code (bad evil)
</commit_message>
<xml_diff>
--- a/Dependency Injection.pptx
+++ b/Dependency Injection.pptx
@@ -7,15 +7,16 @@
   <p:sldIdLst>
     <p:sldId id="256" r:id="rId2"/>
     <p:sldId id="257" r:id="rId3"/>
-    <p:sldId id="259" r:id="rId4"/>
-    <p:sldId id="260" r:id="rId5"/>
-    <p:sldId id="261" r:id="rId6"/>
-    <p:sldId id="262" r:id="rId7"/>
-    <p:sldId id="263" r:id="rId8"/>
-    <p:sldId id="264" r:id="rId9"/>
-    <p:sldId id="265" r:id="rId10"/>
-    <p:sldId id="266" r:id="rId11"/>
-    <p:sldId id="267" r:id="rId12"/>
+    <p:sldId id="268" r:id="rId4"/>
+    <p:sldId id="259" r:id="rId5"/>
+    <p:sldId id="260" r:id="rId6"/>
+    <p:sldId id="261" r:id="rId7"/>
+    <p:sldId id="262" r:id="rId8"/>
+    <p:sldId id="263" r:id="rId9"/>
+    <p:sldId id="264" r:id="rId10"/>
+    <p:sldId id="265" r:id="rId11"/>
+    <p:sldId id="266" r:id="rId12"/>
+    <p:sldId id="267" r:id="rId13"/>
   </p:sldIdLst>
   <p:sldSz cx="12192000" cy="6858000"/>
   <p:notesSz cx="6858000" cy="9144000"/>
@@ -13512,6 +13513,233 @@
           <p:cNvPr id="2" name="Title 1">
             <a:extLst>
               <a:ext uri="{FF2B5EF4-FFF2-40B4-BE49-F238E27FC236}">
+                <a16:creationId xmlns:a16="http://schemas.microsoft.com/office/drawing/2014/main" id="{A8136A13-1CE3-5A89-2C87-19A9FA003965}"/>
+              </a:ext>
+            </a:extLst>
+          </p:cNvPr>
+          <p:cNvSpPr>
+            <a:spLocks noGrp="1"/>
+          </p:cNvSpPr>
+          <p:nvPr>
+            <p:ph type="title"/>
+          </p:nvPr>
+        </p:nvSpPr>
+        <p:spPr/>
+        <p:txBody>
+          <a:bodyPr/>
+          <a:lstStyle/>
+          <a:p>
+            <a:pPr algn="ctr"/>
+            <a:r>
+              <a:rPr lang="bg-BG" sz="3200" dirty="0">
+                <a:latin typeface="Arial" panose="020B0604020202020204" pitchFamily="34" charset="0"/>
+                <a:cs typeface="Arial" panose="020B0604020202020204" pitchFamily="34" charset="0"/>
+              </a:rPr>
+              <a:t>4</a:t>
+            </a:r>
+            <a:r>
+              <a:rPr lang="en-US" sz="3200" dirty="0">
+                <a:latin typeface="Arial" panose="020B0604020202020204" pitchFamily="34" charset="0"/>
+                <a:cs typeface="Arial" panose="020B0604020202020204" pitchFamily="34" charset="0"/>
+              </a:rPr>
+              <a:t>. Tight Coupled Code </a:t>
+            </a:r>
+            <a:br>
+              <a:rPr lang="en-US" sz="3200" dirty="0">
+                <a:latin typeface="Arial" panose="020B0604020202020204" pitchFamily="34" charset="0"/>
+                <a:cs typeface="Arial" panose="020B0604020202020204" pitchFamily="34" charset="0"/>
+              </a:rPr>
+            </a:br>
+            <a:r>
+              <a:rPr lang="en-US" sz="3200" dirty="0">
+                <a:latin typeface="Arial" panose="020B0604020202020204" pitchFamily="34" charset="0"/>
+                <a:cs typeface="Arial" panose="020B0604020202020204" pitchFamily="34" charset="0"/>
+              </a:rPr>
+              <a:t>(Client Notifier)</a:t>
+            </a:r>
+            <a:endParaRPr lang="bg-BG" sz="3200" dirty="0"/>
+          </a:p>
+        </p:txBody>
+      </p:sp>
+      <p:pic>
+        <p:nvPicPr>
+          <p:cNvPr id="5" name="Picture 4" descr="A screenshot of a computer program&#10;&#10;Description automatically generated">
+            <a:extLst>
+              <a:ext uri="{FF2B5EF4-FFF2-40B4-BE49-F238E27FC236}">
+                <a16:creationId xmlns:a16="http://schemas.microsoft.com/office/drawing/2014/main" id="{1BAC6D1E-D972-2676-7F16-4849EC83B80B}"/>
+              </a:ext>
+            </a:extLst>
+          </p:cNvPr>
+          <p:cNvPicPr>
+            <a:picLocks noChangeAspect="1"/>
+          </p:cNvPicPr>
+          <p:nvPr/>
+        </p:nvPicPr>
+        <p:blipFill>
+          <a:blip r:embed="rId2">
+            <a:extLst>
+              <a:ext uri="{28A0092B-C50C-407E-A947-70E740481C1C}">
+                <a14:useLocalDpi xmlns:a14="http://schemas.microsoft.com/office/drawing/2010/main" val="0"/>
+              </a:ext>
+            </a:extLst>
+          </a:blip>
+          <a:stretch>
+            <a:fillRect/>
+          </a:stretch>
+        </p:blipFill>
+        <p:spPr>
+          <a:xfrm>
+            <a:off x="6981048" y="2335651"/>
+            <a:ext cx="4869602" cy="4328535"/>
+          </a:xfrm>
+          <a:prstGeom prst="rect">
+            <a:avLst/>
+          </a:prstGeom>
+        </p:spPr>
+      </p:pic>
+      <p:pic>
+        <p:nvPicPr>
+          <p:cNvPr id="7" name="Picture 6" descr="A screenshot of a chat&#10;&#10;Description automatically generated">
+            <a:extLst>
+              <a:ext uri="{FF2B5EF4-FFF2-40B4-BE49-F238E27FC236}">
+                <a16:creationId xmlns:a16="http://schemas.microsoft.com/office/drawing/2014/main" id="{4EA976F1-94FE-4663-31A3-888A861EC23D}"/>
+              </a:ext>
+            </a:extLst>
+          </p:cNvPr>
+          <p:cNvPicPr>
+            <a:picLocks noChangeAspect="1"/>
+          </p:cNvPicPr>
+          <p:nvPr/>
+        </p:nvPicPr>
+        <p:blipFill>
+          <a:blip r:embed="rId3">
+            <a:extLst>
+              <a:ext uri="{28A0092B-C50C-407E-A947-70E740481C1C}">
+                <a14:useLocalDpi xmlns:a14="http://schemas.microsoft.com/office/drawing/2010/main" val="0"/>
+              </a:ext>
+            </a:extLst>
+          </a:blip>
+          <a:stretch>
+            <a:fillRect/>
+          </a:stretch>
+        </p:blipFill>
+        <p:spPr>
+          <a:xfrm>
+            <a:off x="535275" y="2427327"/>
+            <a:ext cx="3361573" cy="1230575"/>
+          </a:xfrm>
+          <a:prstGeom prst="rect">
+            <a:avLst/>
+          </a:prstGeom>
+        </p:spPr>
+      </p:pic>
+      <p:pic>
+        <p:nvPicPr>
+          <p:cNvPr id="9" name="Picture 8" descr="A screen shot of a computer&#10;&#10;Description automatically generated">
+            <a:extLst>
+              <a:ext uri="{FF2B5EF4-FFF2-40B4-BE49-F238E27FC236}">
+                <a16:creationId xmlns:a16="http://schemas.microsoft.com/office/drawing/2014/main" id="{6EEC3420-8D8C-C9BA-A120-D0980B977AA1}"/>
+              </a:ext>
+            </a:extLst>
+          </p:cNvPr>
+          <p:cNvPicPr>
+            <a:picLocks noChangeAspect="1"/>
+          </p:cNvPicPr>
+          <p:nvPr/>
+        </p:nvPicPr>
+        <p:blipFill>
+          <a:blip r:embed="rId4">
+            <a:extLst>
+              <a:ext uri="{28A0092B-C50C-407E-A947-70E740481C1C}">
+                <a14:useLocalDpi xmlns:a14="http://schemas.microsoft.com/office/drawing/2010/main" val="0"/>
+              </a:ext>
+            </a:extLst>
+          </a:blip>
+          <a:stretch>
+            <a:fillRect/>
+          </a:stretch>
+        </p:blipFill>
+        <p:spPr>
+          <a:xfrm>
+            <a:off x="539170" y="5288810"/>
+            <a:ext cx="3266519" cy="1375376"/>
+          </a:xfrm>
+          <a:prstGeom prst="rect">
+            <a:avLst/>
+          </a:prstGeom>
+        </p:spPr>
+      </p:pic>
+      <p:pic>
+        <p:nvPicPr>
+          <p:cNvPr id="11" name="Picture 10" descr="A screenshot of a computer&#10;&#10;Description automatically generated">
+            <a:extLst>
+              <a:ext uri="{FF2B5EF4-FFF2-40B4-BE49-F238E27FC236}">
+                <a16:creationId xmlns:a16="http://schemas.microsoft.com/office/drawing/2014/main" id="{5809288B-716C-51CC-6BA6-CDC3BA20D6C0}"/>
+              </a:ext>
+            </a:extLst>
+          </p:cNvPr>
+          <p:cNvPicPr>
+            <a:picLocks noChangeAspect="1"/>
+          </p:cNvPicPr>
+          <p:nvPr/>
+        </p:nvPicPr>
+        <p:blipFill>
+          <a:blip r:embed="rId5">
+            <a:extLst>
+              <a:ext uri="{28A0092B-C50C-407E-A947-70E740481C1C}">
+                <a14:useLocalDpi xmlns:a14="http://schemas.microsoft.com/office/drawing/2010/main" val="0"/>
+              </a:ext>
+            </a:extLst>
+          </a:blip>
+          <a:stretch>
+            <a:fillRect/>
+          </a:stretch>
+        </p:blipFill>
+        <p:spPr>
+          <a:xfrm>
+            <a:off x="3313104" y="3746806"/>
+            <a:ext cx="3089708" cy="1375376"/>
+          </a:xfrm>
+          <a:prstGeom prst="rect">
+            <a:avLst/>
+          </a:prstGeom>
+        </p:spPr>
+      </p:pic>
+    </p:spTree>
+    <p:extLst>
+      <p:ext uri="{BB962C8B-B14F-4D97-AF65-F5344CB8AC3E}">
+        <p14:creationId xmlns:p14="http://schemas.microsoft.com/office/powerpoint/2010/main" val="403001632"/>
+      </p:ext>
+    </p:extLst>
+  </p:cSld>
+  <p:clrMapOvr>
+    <a:masterClrMapping/>
+  </p:clrMapOvr>
+</p:sld>
+</file>
+
+<file path=ppt/slides/slide11.xml><?xml version="1.0" encoding="utf-8"?>
+<p:sld xmlns:a="http://schemas.openxmlformats.org/drawingml/2006/main" xmlns:r="http://schemas.openxmlformats.org/officeDocument/2006/relationships" xmlns:p="http://schemas.openxmlformats.org/presentationml/2006/main">
+  <p:cSld>
+    <p:spTree>
+      <p:nvGrpSpPr>
+        <p:cNvPr id="1" name=""/>
+        <p:cNvGrpSpPr/>
+        <p:nvPr/>
+      </p:nvGrpSpPr>
+      <p:grpSpPr>
+        <a:xfrm>
+          <a:off x="0" y="0"/>
+          <a:ext cx="0" cy="0"/>
+          <a:chOff x="0" y="0"/>
+          <a:chExt cx="0" cy="0"/>
+        </a:xfrm>
+      </p:grpSpPr>
+      <p:sp>
+        <p:nvSpPr>
+          <p:cNvPr id="2" name="Title 1">
+            <a:extLst>
+              <a:ext uri="{FF2B5EF4-FFF2-40B4-BE49-F238E27FC236}">
                 <a16:creationId xmlns:a16="http://schemas.microsoft.com/office/drawing/2014/main" id="{3AB6EEBD-DE5B-6BD7-24F1-BFBACDE5FB1B}"/>
               </a:ext>
             </a:extLst>
@@ -14010,7 +14238,7 @@
 </p:sld>
 </file>
 
-<file path=ppt/slides/slide11.xml><?xml version="1.0" encoding="utf-8"?>
+<file path=ppt/slides/slide12.xml><?xml version="1.0" encoding="utf-8"?>
 <p:sld xmlns:a="http://schemas.openxmlformats.org/drawingml/2006/main" xmlns:r="http://schemas.openxmlformats.org/officeDocument/2006/relationships" xmlns:p="http://schemas.openxmlformats.org/presentationml/2006/main">
   <p:cSld>
     <p:spTree>
@@ -14428,6 +14656,231 @@
           <p:cNvPr id="2" name="Title 1">
             <a:extLst>
               <a:ext uri="{FF2B5EF4-FFF2-40B4-BE49-F238E27FC236}">
+                <a16:creationId xmlns:a16="http://schemas.microsoft.com/office/drawing/2014/main" id="{1E604DB1-3D05-9063-FB8A-7B9C62982B4C}"/>
+              </a:ext>
+            </a:extLst>
+          </p:cNvPr>
+          <p:cNvSpPr>
+            <a:spLocks noGrp="1"/>
+          </p:cNvSpPr>
+          <p:nvPr>
+            <p:ph type="title"/>
+          </p:nvPr>
+        </p:nvSpPr>
+        <p:spPr/>
+        <p:txBody>
+          <a:bodyPr/>
+          <a:lstStyle/>
+          <a:p>
+            <a:pPr algn="ctr"/>
+            <a:r>
+              <a:rPr lang="en-US" dirty="0">
+                <a:latin typeface="Arial" panose="020B0604020202020204" pitchFamily="34" charset="0"/>
+                <a:cs typeface="Arial" panose="020B0604020202020204" pitchFamily="34" charset="0"/>
+              </a:rPr>
+              <a:t>Why Tightly Coupled code is </a:t>
+            </a:r>
+            <a:r>
+              <a:rPr lang="en-US" dirty="0">
+                <a:solidFill>
+                  <a:srgbClr val="FF0000"/>
+                </a:solidFill>
+                <a:latin typeface="Arial" panose="020B0604020202020204" pitchFamily="34" charset="0"/>
+                <a:cs typeface="Arial" panose="020B0604020202020204" pitchFamily="34" charset="0"/>
+              </a:rPr>
+              <a:t>BAD EVIL</a:t>
+            </a:r>
+            <a:r>
+              <a:rPr lang="en-US" dirty="0">
+                <a:latin typeface="Arial" panose="020B0604020202020204" pitchFamily="34" charset="0"/>
+                <a:cs typeface="Arial" panose="020B0604020202020204" pitchFamily="34" charset="0"/>
+              </a:rPr>
+              <a:t>?</a:t>
+            </a:r>
+            <a:endParaRPr lang="bg-BG" dirty="0">
+              <a:latin typeface="Arial" panose="020B0604020202020204" pitchFamily="34" charset="0"/>
+              <a:cs typeface="Arial" panose="020B0604020202020204" pitchFamily="34" charset="0"/>
+            </a:endParaRPr>
+          </a:p>
+        </p:txBody>
+      </p:sp>
+      <p:sp>
+        <p:nvSpPr>
+          <p:cNvPr id="3" name="Content Placeholder 2">
+            <a:extLst>
+              <a:ext uri="{FF2B5EF4-FFF2-40B4-BE49-F238E27FC236}">
+                <a16:creationId xmlns:a16="http://schemas.microsoft.com/office/drawing/2014/main" id="{DC01A3E1-4AAF-4217-0234-CEF83D3285A9}"/>
+              </a:ext>
+            </a:extLst>
+          </p:cNvPr>
+          <p:cNvSpPr>
+            <a:spLocks noGrp="1"/>
+          </p:cNvSpPr>
+          <p:nvPr>
+            <p:ph idx="1"/>
+          </p:nvPr>
+        </p:nvSpPr>
+        <p:spPr>
+          <a:xfrm>
+            <a:off x="1154954" y="2603500"/>
+            <a:ext cx="4603295" cy="3220651"/>
+          </a:xfrm>
+        </p:spPr>
+        <p:txBody>
+          <a:bodyPr>
+            <a:normAutofit/>
+          </a:bodyPr>
+          <a:lstStyle/>
+          <a:p>
+            <a:r>
+              <a:rPr lang="en-US" sz="2400" dirty="0">
+                <a:latin typeface="Arial" panose="020B0604020202020204" pitchFamily="34" charset="0"/>
+                <a:cs typeface="Arial" panose="020B0604020202020204" pitchFamily="34" charset="0"/>
+              </a:rPr>
+              <a:t>NOT Flexible</a:t>
+            </a:r>
+          </a:p>
+          <a:p>
+            <a:r>
+              <a:rPr lang="en-US" sz="2400" dirty="0">
+                <a:latin typeface="Arial" panose="020B0604020202020204" pitchFamily="34" charset="0"/>
+                <a:cs typeface="Arial" panose="020B0604020202020204" pitchFamily="34" charset="0"/>
+              </a:rPr>
+              <a:t>NOT Maintainable</a:t>
+            </a:r>
+          </a:p>
+          <a:p>
+            <a:r>
+              <a:rPr lang="en-US" sz="2400" dirty="0">
+                <a:latin typeface="Arial" panose="020B0604020202020204" pitchFamily="34" charset="0"/>
+                <a:cs typeface="Arial" panose="020B0604020202020204" pitchFamily="34" charset="0"/>
+              </a:rPr>
+              <a:t>NOT Testable</a:t>
+            </a:r>
+          </a:p>
+          <a:p>
+            <a:r>
+              <a:rPr lang="en-US" sz="2400" dirty="0">
+                <a:latin typeface="Arial" panose="020B0604020202020204" pitchFamily="34" charset="0"/>
+                <a:cs typeface="Arial" panose="020B0604020202020204" pitchFamily="34" charset="0"/>
+              </a:rPr>
+              <a:t>NOT Scalable</a:t>
+            </a:r>
+          </a:p>
+          <a:p>
+            <a:r>
+              <a:rPr lang="en-US" sz="2400" dirty="0">
+                <a:latin typeface="Arial" panose="020B0604020202020204" pitchFamily="34" charset="0"/>
+                <a:cs typeface="Arial" panose="020B0604020202020204" pitchFamily="34" charset="0"/>
+              </a:rPr>
+              <a:t>Poor separation of concerns</a:t>
+            </a:r>
+          </a:p>
+          <a:p>
+            <a:endParaRPr lang="bg-BG" sz="2400" dirty="0">
+              <a:latin typeface="Arial" panose="020B0604020202020204" pitchFamily="34" charset="0"/>
+              <a:cs typeface="Arial" panose="020B0604020202020204" pitchFamily="34" charset="0"/>
+            </a:endParaRPr>
+          </a:p>
+        </p:txBody>
+      </p:sp>
+      <p:pic>
+        <p:nvPicPr>
+          <p:cNvPr id="5" name="Picture 4" descr="A yellow emoji with a sad face and thumb down&#10;&#10;Description automatically generated">
+            <a:extLst>
+              <a:ext uri="{FF2B5EF4-FFF2-40B4-BE49-F238E27FC236}">
+                <a16:creationId xmlns:a16="http://schemas.microsoft.com/office/drawing/2014/main" id="{D40A905A-C891-451D-8BA3-D105D0B3A086}"/>
+              </a:ext>
+            </a:extLst>
+          </p:cNvPr>
+          <p:cNvPicPr>
+            <a:picLocks noChangeAspect="1"/>
+          </p:cNvPicPr>
+          <p:nvPr/>
+        </p:nvPicPr>
+        <p:blipFill>
+          <a:blip r:embed="rId2">
+            <a:extLst>
+              <a:ext uri="{28A0092B-C50C-407E-A947-70E740481C1C}">
+                <a14:useLocalDpi xmlns:a14="http://schemas.microsoft.com/office/drawing/2010/main" val="0"/>
+              </a:ext>
+            </a:extLst>
+          </a:blip>
+          <a:stretch>
+            <a:fillRect/>
+          </a:stretch>
+        </p:blipFill>
+        <p:spPr>
+          <a:xfrm>
+            <a:off x="7018639" y="2603500"/>
+            <a:ext cx="3893831" cy="3893831"/>
+          </a:xfrm>
+          <a:prstGeom prst="roundRect">
+            <a:avLst>
+              <a:gd name="adj" fmla="val 4167"/>
+            </a:avLst>
+          </a:prstGeom>
+          <a:solidFill>
+            <a:srgbClr val="FFFFFF"/>
+          </a:solidFill>
+          <a:ln w="76200" cap="sq">
+            <a:solidFill>
+              <a:srgbClr val="EAEAEA"/>
+            </a:solidFill>
+            <a:miter lim="800000"/>
+          </a:ln>
+          <a:effectLst>
+            <a:reflection blurRad="12700" stA="33000" endPos="28000" dist="5000" dir="5400000" sy="-100000" algn="bl" rotWithShape="0"/>
+          </a:effectLst>
+          <a:scene3d>
+            <a:camera prst="orthographicFront"/>
+            <a:lightRig rig="threePt" dir="t">
+              <a:rot lat="0" lon="0" rev="2700000"/>
+            </a:lightRig>
+          </a:scene3d>
+          <a:sp3d contourW="6350">
+            <a:bevelT h="38100"/>
+            <a:contourClr>
+              <a:srgbClr val="C0C0C0"/>
+            </a:contourClr>
+          </a:sp3d>
+        </p:spPr>
+      </p:pic>
+    </p:spTree>
+    <p:extLst>
+      <p:ext uri="{BB962C8B-B14F-4D97-AF65-F5344CB8AC3E}">
+        <p14:creationId xmlns:p14="http://schemas.microsoft.com/office/powerpoint/2010/main" val="853100807"/>
+      </p:ext>
+    </p:extLst>
+  </p:cSld>
+  <p:clrMapOvr>
+    <a:masterClrMapping/>
+  </p:clrMapOvr>
+</p:sld>
+</file>
+
+<file path=ppt/slides/slide4.xml><?xml version="1.0" encoding="utf-8"?>
+<p:sld xmlns:a="http://schemas.openxmlformats.org/drawingml/2006/main" xmlns:r="http://schemas.openxmlformats.org/officeDocument/2006/relationships" xmlns:p="http://schemas.openxmlformats.org/presentationml/2006/main">
+  <p:cSld>
+    <p:spTree>
+      <p:nvGrpSpPr>
+        <p:cNvPr id="1" name=""/>
+        <p:cNvGrpSpPr/>
+        <p:nvPr/>
+      </p:nvGrpSpPr>
+      <p:grpSpPr>
+        <a:xfrm>
+          <a:off x="0" y="0"/>
+          <a:ext cx="0" cy="0"/>
+          <a:chOff x="0" y="0"/>
+          <a:chExt cx="0" cy="0"/>
+        </a:xfrm>
+      </p:grpSpPr>
+      <p:sp>
+        <p:nvSpPr>
+          <p:cNvPr id="2" name="Title 1">
+            <a:extLst>
+              <a:ext uri="{FF2B5EF4-FFF2-40B4-BE49-F238E27FC236}">
                 <a16:creationId xmlns:a16="http://schemas.microsoft.com/office/drawing/2014/main" id="{ADB65FEB-7FA3-DBCA-4C65-D8574DBA5CD9}"/>
               </a:ext>
             </a:extLst>
@@ -14610,7 +15063,7 @@
 </p:sld>
 </file>
 
-<file path=ppt/slides/slide4.xml><?xml version="1.0" encoding="utf-8"?>
+<file path=ppt/slides/slide5.xml><?xml version="1.0" encoding="utf-8"?>
 <p:sld xmlns:a="http://schemas.openxmlformats.org/drawingml/2006/main" xmlns:r="http://schemas.openxmlformats.org/officeDocument/2006/relationships" xmlns:p="http://schemas.openxmlformats.org/presentationml/2006/main">
   <p:cSld>
     <p:spTree>
@@ -15235,7 +15688,7 @@
 </p:sld>
 </file>
 
-<file path=ppt/slides/slide5.xml><?xml version="1.0" encoding="utf-8"?>
+<file path=ppt/slides/slide6.xml><?xml version="1.0" encoding="utf-8"?>
 <p:sld xmlns:a="http://schemas.openxmlformats.org/drawingml/2006/main" xmlns:r="http://schemas.openxmlformats.org/officeDocument/2006/relationships" xmlns:p="http://schemas.openxmlformats.org/presentationml/2006/main">
   <p:cSld>
     <p:spTree>
@@ -15462,7 +15915,7 @@
 </p:sld>
 </file>
 
-<file path=ppt/slides/slide6.xml><?xml version="1.0" encoding="utf-8"?>
+<file path=ppt/slides/slide7.xml><?xml version="1.0" encoding="utf-8"?>
 <p:sld xmlns:a="http://schemas.openxmlformats.org/drawingml/2006/main" xmlns:r="http://schemas.openxmlformats.org/officeDocument/2006/relationships" xmlns:p="http://schemas.openxmlformats.org/presentationml/2006/main">
   <p:cSld>
     <p:spTree>
@@ -15939,7 +16392,7 @@
 </p:sld>
 </file>
 
-<file path=ppt/slides/slide7.xml><?xml version="1.0" encoding="utf-8"?>
+<file path=ppt/slides/slide8.xml><?xml version="1.0" encoding="utf-8"?>
 <p:sld xmlns:a="http://schemas.openxmlformats.org/drawingml/2006/main" xmlns:r="http://schemas.openxmlformats.org/officeDocument/2006/relationships" xmlns:p="http://schemas.openxmlformats.org/presentationml/2006/main">
   <p:cSld>
     <p:spTree>
@@ -16170,7 +16623,7 @@
 </p:sld>
 </file>
 
-<file path=ppt/slides/slide8.xml><?xml version="1.0" encoding="utf-8"?>
+<file path=ppt/slides/slide9.xml><?xml version="1.0" encoding="utf-8"?>
 <p:sld xmlns:a="http://schemas.openxmlformats.org/drawingml/2006/main" xmlns:r="http://schemas.openxmlformats.org/officeDocument/2006/relationships" xmlns:p="http://schemas.openxmlformats.org/presentationml/2006/main">
   <p:cSld>
     <p:spTree>
@@ -16518,233 +16971,6 @@
     <p:extLst>
       <p:ext uri="{BB962C8B-B14F-4D97-AF65-F5344CB8AC3E}">
         <p14:creationId xmlns:p14="http://schemas.microsoft.com/office/powerpoint/2010/main" val="4107333194"/>
-      </p:ext>
-    </p:extLst>
-  </p:cSld>
-  <p:clrMapOvr>
-    <a:masterClrMapping/>
-  </p:clrMapOvr>
-</p:sld>
-</file>
-
-<file path=ppt/slides/slide9.xml><?xml version="1.0" encoding="utf-8"?>
-<p:sld xmlns:a="http://schemas.openxmlformats.org/drawingml/2006/main" xmlns:r="http://schemas.openxmlformats.org/officeDocument/2006/relationships" xmlns:p="http://schemas.openxmlformats.org/presentationml/2006/main">
-  <p:cSld>
-    <p:spTree>
-      <p:nvGrpSpPr>
-        <p:cNvPr id="1" name=""/>
-        <p:cNvGrpSpPr/>
-        <p:nvPr/>
-      </p:nvGrpSpPr>
-      <p:grpSpPr>
-        <a:xfrm>
-          <a:off x="0" y="0"/>
-          <a:ext cx="0" cy="0"/>
-          <a:chOff x="0" y="0"/>
-          <a:chExt cx="0" cy="0"/>
-        </a:xfrm>
-      </p:grpSpPr>
-      <p:sp>
-        <p:nvSpPr>
-          <p:cNvPr id="2" name="Title 1">
-            <a:extLst>
-              <a:ext uri="{FF2B5EF4-FFF2-40B4-BE49-F238E27FC236}">
-                <a16:creationId xmlns:a16="http://schemas.microsoft.com/office/drawing/2014/main" id="{A8136A13-1CE3-5A89-2C87-19A9FA003965}"/>
-              </a:ext>
-            </a:extLst>
-          </p:cNvPr>
-          <p:cNvSpPr>
-            <a:spLocks noGrp="1"/>
-          </p:cNvSpPr>
-          <p:nvPr>
-            <p:ph type="title"/>
-          </p:nvPr>
-        </p:nvSpPr>
-        <p:spPr/>
-        <p:txBody>
-          <a:bodyPr/>
-          <a:lstStyle/>
-          <a:p>
-            <a:pPr algn="ctr"/>
-            <a:r>
-              <a:rPr lang="bg-BG" sz="3200" dirty="0">
-                <a:latin typeface="Arial" panose="020B0604020202020204" pitchFamily="34" charset="0"/>
-                <a:cs typeface="Arial" panose="020B0604020202020204" pitchFamily="34" charset="0"/>
-              </a:rPr>
-              <a:t>4</a:t>
-            </a:r>
-            <a:r>
-              <a:rPr lang="en-US" sz="3200" dirty="0">
-                <a:latin typeface="Arial" panose="020B0604020202020204" pitchFamily="34" charset="0"/>
-                <a:cs typeface="Arial" panose="020B0604020202020204" pitchFamily="34" charset="0"/>
-              </a:rPr>
-              <a:t>. Tight Coupled Code </a:t>
-            </a:r>
-            <a:br>
-              <a:rPr lang="en-US" sz="3200" dirty="0">
-                <a:latin typeface="Arial" panose="020B0604020202020204" pitchFamily="34" charset="0"/>
-                <a:cs typeface="Arial" panose="020B0604020202020204" pitchFamily="34" charset="0"/>
-              </a:rPr>
-            </a:br>
-            <a:r>
-              <a:rPr lang="en-US" sz="3200" dirty="0">
-                <a:latin typeface="Arial" panose="020B0604020202020204" pitchFamily="34" charset="0"/>
-                <a:cs typeface="Arial" panose="020B0604020202020204" pitchFamily="34" charset="0"/>
-              </a:rPr>
-              <a:t>(Client Notifier)</a:t>
-            </a:r>
-            <a:endParaRPr lang="bg-BG" sz="3200" dirty="0"/>
-          </a:p>
-        </p:txBody>
-      </p:sp>
-      <p:pic>
-        <p:nvPicPr>
-          <p:cNvPr id="5" name="Picture 4" descr="A screenshot of a computer program&#10;&#10;Description automatically generated">
-            <a:extLst>
-              <a:ext uri="{FF2B5EF4-FFF2-40B4-BE49-F238E27FC236}">
-                <a16:creationId xmlns:a16="http://schemas.microsoft.com/office/drawing/2014/main" id="{1BAC6D1E-D972-2676-7F16-4849EC83B80B}"/>
-              </a:ext>
-            </a:extLst>
-          </p:cNvPr>
-          <p:cNvPicPr>
-            <a:picLocks noChangeAspect="1"/>
-          </p:cNvPicPr>
-          <p:nvPr/>
-        </p:nvPicPr>
-        <p:blipFill>
-          <a:blip r:embed="rId2">
-            <a:extLst>
-              <a:ext uri="{28A0092B-C50C-407E-A947-70E740481C1C}">
-                <a14:useLocalDpi xmlns:a14="http://schemas.microsoft.com/office/drawing/2010/main" val="0"/>
-              </a:ext>
-            </a:extLst>
-          </a:blip>
-          <a:stretch>
-            <a:fillRect/>
-          </a:stretch>
-        </p:blipFill>
-        <p:spPr>
-          <a:xfrm>
-            <a:off x="6981048" y="2335651"/>
-            <a:ext cx="4869602" cy="4328535"/>
-          </a:xfrm>
-          <a:prstGeom prst="rect">
-            <a:avLst/>
-          </a:prstGeom>
-        </p:spPr>
-      </p:pic>
-      <p:pic>
-        <p:nvPicPr>
-          <p:cNvPr id="7" name="Picture 6" descr="A screenshot of a chat&#10;&#10;Description automatically generated">
-            <a:extLst>
-              <a:ext uri="{FF2B5EF4-FFF2-40B4-BE49-F238E27FC236}">
-                <a16:creationId xmlns:a16="http://schemas.microsoft.com/office/drawing/2014/main" id="{4EA976F1-94FE-4663-31A3-888A861EC23D}"/>
-              </a:ext>
-            </a:extLst>
-          </p:cNvPr>
-          <p:cNvPicPr>
-            <a:picLocks noChangeAspect="1"/>
-          </p:cNvPicPr>
-          <p:nvPr/>
-        </p:nvPicPr>
-        <p:blipFill>
-          <a:blip r:embed="rId3">
-            <a:extLst>
-              <a:ext uri="{28A0092B-C50C-407E-A947-70E740481C1C}">
-                <a14:useLocalDpi xmlns:a14="http://schemas.microsoft.com/office/drawing/2010/main" val="0"/>
-              </a:ext>
-            </a:extLst>
-          </a:blip>
-          <a:stretch>
-            <a:fillRect/>
-          </a:stretch>
-        </p:blipFill>
-        <p:spPr>
-          <a:xfrm>
-            <a:off x="535275" y="2427327"/>
-            <a:ext cx="3361573" cy="1230575"/>
-          </a:xfrm>
-          <a:prstGeom prst="rect">
-            <a:avLst/>
-          </a:prstGeom>
-        </p:spPr>
-      </p:pic>
-      <p:pic>
-        <p:nvPicPr>
-          <p:cNvPr id="9" name="Picture 8" descr="A screen shot of a computer&#10;&#10;Description automatically generated">
-            <a:extLst>
-              <a:ext uri="{FF2B5EF4-FFF2-40B4-BE49-F238E27FC236}">
-                <a16:creationId xmlns:a16="http://schemas.microsoft.com/office/drawing/2014/main" id="{6EEC3420-8D8C-C9BA-A120-D0980B977AA1}"/>
-              </a:ext>
-            </a:extLst>
-          </p:cNvPr>
-          <p:cNvPicPr>
-            <a:picLocks noChangeAspect="1"/>
-          </p:cNvPicPr>
-          <p:nvPr/>
-        </p:nvPicPr>
-        <p:blipFill>
-          <a:blip r:embed="rId4">
-            <a:extLst>
-              <a:ext uri="{28A0092B-C50C-407E-A947-70E740481C1C}">
-                <a14:useLocalDpi xmlns:a14="http://schemas.microsoft.com/office/drawing/2010/main" val="0"/>
-              </a:ext>
-            </a:extLst>
-          </a:blip>
-          <a:stretch>
-            <a:fillRect/>
-          </a:stretch>
-        </p:blipFill>
-        <p:spPr>
-          <a:xfrm>
-            <a:off x="539170" y="5288810"/>
-            <a:ext cx="3266519" cy="1375376"/>
-          </a:xfrm>
-          <a:prstGeom prst="rect">
-            <a:avLst/>
-          </a:prstGeom>
-        </p:spPr>
-      </p:pic>
-      <p:pic>
-        <p:nvPicPr>
-          <p:cNvPr id="11" name="Picture 10" descr="A screenshot of a computer&#10;&#10;Description automatically generated">
-            <a:extLst>
-              <a:ext uri="{FF2B5EF4-FFF2-40B4-BE49-F238E27FC236}">
-                <a16:creationId xmlns:a16="http://schemas.microsoft.com/office/drawing/2014/main" id="{5809288B-716C-51CC-6BA6-CDC3BA20D6C0}"/>
-              </a:ext>
-            </a:extLst>
-          </p:cNvPr>
-          <p:cNvPicPr>
-            <a:picLocks noChangeAspect="1"/>
-          </p:cNvPicPr>
-          <p:nvPr/>
-        </p:nvPicPr>
-        <p:blipFill>
-          <a:blip r:embed="rId5">
-            <a:extLst>
-              <a:ext uri="{28A0092B-C50C-407E-A947-70E740481C1C}">
-                <a14:useLocalDpi xmlns:a14="http://schemas.microsoft.com/office/drawing/2010/main" val="0"/>
-              </a:ext>
-            </a:extLst>
-          </a:blip>
-          <a:stretch>
-            <a:fillRect/>
-          </a:stretch>
-        </p:blipFill>
-        <p:spPr>
-          <a:xfrm>
-            <a:off x="3313104" y="3746806"/>
-            <a:ext cx="3089708" cy="1375376"/>
-          </a:xfrm>
-          <a:prstGeom prst="rect">
-            <a:avLst/>
-          </a:prstGeom>
-        </p:spPr>
-      </p:pic>
-    </p:spTree>
-    <p:extLst>
-      <p:ext uri="{BB962C8B-B14F-4D97-AF65-F5344CB8AC3E}">
-        <p14:creationId xmlns:p14="http://schemas.microsoft.com/office/powerpoint/2010/main" val="403001632"/>
       </p:ext>
     </p:extLst>
   </p:cSld>

</xml_diff>

<commit_message>
Add Parallel Development as a benefit from DI
</commit_message>
<xml_diff>
--- a/Dependency Injection.pptx
+++ b/Dependency Injection.pptx
@@ -14452,7 +14452,7 @@
         </p:spPr>
         <p:txBody>
           <a:bodyPr>
-            <a:normAutofit fontScale="92500" lnSpcReduction="10000"/>
+            <a:normAutofit fontScale="92500" lnSpcReduction="20000"/>
           </a:bodyPr>
           <a:lstStyle/>
           <a:p>
@@ -14507,6 +14507,15 @@
                 <a:cs typeface="Arial" panose="020B0604020202020204" pitchFamily="34" charset="0"/>
               </a:rPr>
               <a:t>Late Binding</a:t>
+            </a:r>
+          </a:p>
+          <a:p>
+            <a:r>
+              <a:rPr lang="en-US" sz="2000" dirty="0">
+                <a:latin typeface="Arial" panose="020B0604020202020204" pitchFamily="34" charset="0"/>
+                <a:cs typeface="Arial" panose="020B0604020202020204" pitchFamily="34" charset="0"/>
+              </a:rPr>
+              <a:t>Parallel Development</a:t>
             </a:r>
           </a:p>
           <a:p>

</xml_diff>